<commit_message>
Add slide with a unique hexagon
</commit_message>
<xml_diff>
--- a/HexagonalAndBeyond.pptx
+++ b/HexagonalAndBeyond.pptx
@@ -10,7 +10,8 @@
     <p:sldId id="258" r:id="rId4"/>
     <p:sldId id="259" r:id="rId5"/>
     <p:sldId id="260" r:id="rId6"/>
-    <p:sldId id="264" r:id="rId7"/>
+    <p:sldId id="265" r:id="rId7"/>
+    <p:sldId id="264" r:id="rId8"/>
   </p:sldIdLst>
   <p:sldSz cx="12192000" cy="6858000"/>
   <p:notesSz cx="6858000" cy="9144000"/>
@@ -285,7 +286,7 @@
           <a:p>
             <a:fld id="{DC0C38C1-EB25-493B-8E40-CB7D44766240}" type="datetimeFigureOut">
               <a:rPr lang="fr-FR" smtClean="0"/>
-              <a:t>31/05/2022</a:t>
+              <a:t>02/06/2022</a:t>
             </a:fld>
             <a:endParaRPr lang="fr-FR"/>
           </a:p>
@@ -493,7 +494,7 @@
           <a:p>
             <a:fld id="{DC0C38C1-EB25-493B-8E40-CB7D44766240}" type="datetimeFigureOut">
               <a:rPr lang="fr-FR" smtClean="0"/>
-              <a:t>31/05/2022</a:t>
+              <a:t>02/06/2022</a:t>
             </a:fld>
             <a:endParaRPr lang="fr-FR"/>
           </a:p>
@@ -711,7 +712,7 @@
           <a:p>
             <a:fld id="{DC0C38C1-EB25-493B-8E40-CB7D44766240}" type="datetimeFigureOut">
               <a:rPr lang="fr-FR" smtClean="0"/>
-              <a:t>31/05/2022</a:t>
+              <a:t>02/06/2022</a:t>
             </a:fld>
             <a:endParaRPr lang="fr-FR"/>
           </a:p>
@@ -919,7 +920,7 @@
           <a:p>
             <a:fld id="{DC0C38C1-EB25-493B-8E40-CB7D44766240}" type="datetimeFigureOut">
               <a:rPr lang="fr-FR" smtClean="0"/>
-              <a:t>31/05/2022</a:t>
+              <a:t>02/06/2022</a:t>
             </a:fld>
             <a:endParaRPr lang="fr-FR"/>
           </a:p>
@@ -1203,7 +1204,7 @@
           <a:p>
             <a:fld id="{DC0C38C1-EB25-493B-8E40-CB7D44766240}" type="datetimeFigureOut">
               <a:rPr lang="fr-FR" smtClean="0"/>
-              <a:t>31/05/2022</a:t>
+              <a:t>02/06/2022</a:t>
             </a:fld>
             <a:endParaRPr lang="fr-FR"/>
           </a:p>
@@ -1479,7 +1480,7 @@
           <a:p>
             <a:fld id="{DC0C38C1-EB25-493B-8E40-CB7D44766240}" type="datetimeFigureOut">
               <a:rPr lang="fr-FR" smtClean="0"/>
-              <a:t>31/05/2022</a:t>
+              <a:t>02/06/2022</a:t>
             </a:fld>
             <a:endParaRPr lang="fr-FR"/>
           </a:p>
@@ -1902,7 +1903,7 @@
           <a:p>
             <a:fld id="{DC0C38C1-EB25-493B-8E40-CB7D44766240}" type="datetimeFigureOut">
               <a:rPr lang="fr-FR" smtClean="0"/>
-              <a:t>31/05/2022</a:t>
+              <a:t>02/06/2022</a:t>
             </a:fld>
             <a:endParaRPr lang="fr-FR"/>
           </a:p>
@@ -2052,7 +2053,7 @@
           <a:p>
             <a:fld id="{DC0C38C1-EB25-493B-8E40-CB7D44766240}" type="datetimeFigureOut">
               <a:rPr lang="fr-FR" smtClean="0"/>
-              <a:t>31/05/2022</a:t>
+              <a:t>02/06/2022</a:t>
             </a:fld>
             <a:endParaRPr lang="fr-FR"/>
           </a:p>
@@ -2173,7 +2174,7 @@
           <a:p>
             <a:fld id="{DC0C38C1-EB25-493B-8E40-CB7D44766240}" type="datetimeFigureOut">
               <a:rPr lang="fr-FR" smtClean="0"/>
-              <a:t>31/05/2022</a:t>
+              <a:t>02/06/2022</a:t>
             </a:fld>
             <a:endParaRPr lang="fr-FR"/>
           </a:p>
@@ -2494,7 +2495,7 @@
           <a:p>
             <a:fld id="{DC0C38C1-EB25-493B-8E40-CB7D44766240}" type="datetimeFigureOut">
               <a:rPr lang="fr-FR" smtClean="0"/>
-              <a:t>31/05/2022</a:t>
+              <a:t>02/06/2022</a:t>
             </a:fld>
             <a:endParaRPr lang="fr-FR"/>
           </a:p>
@@ -2791,7 +2792,7 @@
           <a:p>
             <a:fld id="{DC0C38C1-EB25-493B-8E40-CB7D44766240}" type="datetimeFigureOut">
               <a:rPr lang="fr-FR" smtClean="0"/>
-              <a:t>31/05/2022</a:t>
+              <a:t>02/06/2022</a:t>
             </a:fld>
             <a:endParaRPr lang="fr-FR"/>
           </a:p>
@@ -3037,7 +3038,7 @@
           <a:p>
             <a:fld id="{DC0C38C1-EB25-493B-8E40-CB7D44766240}" type="datetimeFigureOut">
               <a:rPr lang="fr-FR" smtClean="0"/>
-              <a:t>31/05/2022</a:t>
+              <a:t>02/06/2022</a:t>
             </a:fld>
             <a:endParaRPr lang="fr-FR"/>
           </a:p>
@@ -36204,6 +36205,2170 @@
     <p:bg>
       <p:bgPr>
         <a:solidFill>
+          <a:schemeClr val="accent2">
+            <a:lumMod val="20000"/>
+            <a:lumOff val="80000"/>
+          </a:schemeClr>
+        </a:solidFill>
+        <a:effectLst/>
+      </p:bgPr>
+    </p:bg>
+    <p:spTree>
+      <p:nvGrpSpPr>
+        <p:cNvPr id="1" name=""/>
+        <p:cNvGrpSpPr/>
+        <p:nvPr/>
+      </p:nvGrpSpPr>
+      <p:grpSpPr>
+        <a:xfrm>
+          <a:off x="0" y="0"/>
+          <a:ext cx="0" cy="0"/>
+          <a:chOff x="0" y="0"/>
+          <a:chExt cx="0" cy="0"/>
+        </a:xfrm>
+      </p:grpSpPr>
+      <p:sp>
+        <p:nvSpPr>
+          <p:cNvPr id="76" name="TextBox 75">
+            <a:extLst>
+              <a:ext uri="{FF2B5EF4-FFF2-40B4-BE49-F238E27FC236}">
+                <a16:creationId xmlns:a16="http://schemas.microsoft.com/office/drawing/2014/main" id="{6C22163D-87CF-BDE6-599E-F2275CD480AD}"/>
+              </a:ext>
+            </a:extLst>
+          </p:cNvPr>
+          <p:cNvSpPr txBox="1"/>
+          <p:nvPr/>
+        </p:nvSpPr>
+        <p:spPr>
+          <a:xfrm>
+            <a:off x="553665" y="176549"/>
+            <a:ext cx="11130335" cy="461665"/>
+          </a:xfrm>
+          <a:prstGeom prst="rect">
+            <a:avLst/>
+          </a:prstGeom>
+          <a:noFill/>
+        </p:spPr>
+        <p:txBody>
+          <a:bodyPr wrap="square" rtlCol="0" anchor="t">
+            <a:spAutoFit/>
+          </a:bodyPr>
+          <a:lstStyle/>
+          <a:p>
+            <a:pPr algn="r"/>
+            <a:r>
+              <a:rPr lang="en-US" sz="2300" b="1" cap="all" dirty="0">
+                <a:solidFill>
+                  <a:srgbClr val="C00000"/>
+                </a:solidFill>
+                <a:latin typeface="Alte Haas Grotesk" panose="02000503000000020004" pitchFamily="2" charset="0"/>
+              </a:rPr>
+              <a:t>Hexagonal “Micro” services</a:t>
+            </a:r>
+          </a:p>
+        </p:txBody>
+      </p:sp>
+      <p:sp>
+        <p:nvSpPr>
+          <p:cNvPr id="139" name="TextBox 138">
+            <a:extLst>
+              <a:ext uri="{FF2B5EF4-FFF2-40B4-BE49-F238E27FC236}">
+                <a16:creationId xmlns:a16="http://schemas.microsoft.com/office/drawing/2014/main" id="{D87D58F9-2C40-7FD4-B61B-2A6215BFBADB}"/>
+              </a:ext>
+            </a:extLst>
+          </p:cNvPr>
+          <p:cNvSpPr txBox="1"/>
+          <p:nvPr/>
+        </p:nvSpPr>
+        <p:spPr>
+          <a:xfrm>
+            <a:off x="8269919" y="698400"/>
+            <a:ext cx="3364147" cy="369332"/>
+          </a:xfrm>
+          <a:prstGeom prst="rect">
+            <a:avLst/>
+          </a:prstGeom>
+          <a:noFill/>
+        </p:spPr>
+        <p:txBody>
+          <a:bodyPr wrap="square" rtlCol="0">
+            <a:spAutoFit/>
+          </a:bodyPr>
+          <a:lstStyle/>
+          <a:p>
+            <a:pPr algn="r"/>
+            <a:r>
+              <a:rPr lang="en-US" dirty="0"/>
+              <a:t>@tpierrain (use case driven)</a:t>
+            </a:r>
+          </a:p>
+        </p:txBody>
+      </p:sp>
+      <p:cxnSp>
+        <p:nvCxnSpPr>
+          <p:cNvPr id="80" name="Straight Arrow Connector 79">
+            <a:extLst>
+              <a:ext uri="{FF2B5EF4-FFF2-40B4-BE49-F238E27FC236}">
+                <a16:creationId xmlns:a16="http://schemas.microsoft.com/office/drawing/2014/main" id="{CF148EDC-DFD7-DD46-9E09-4881F99D4190}"/>
+              </a:ext>
+            </a:extLst>
+          </p:cNvPr>
+          <p:cNvCxnSpPr>
+            <a:cxnSpLocks/>
+            <a:stCxn id="216" idx="2"/>
+            <a:endCxn id="54" idx="3"/>
+          </p:cNvCxnSpPr>
+          <p:nvPr/>
+        </p:nvCxnSpPr>
+        <p:spPr>
+          <a:xfrm>
+            <a:off x="7481098" y="4095553"/>
+            <a:ext cx="1504138" cy="519474"/>
+          </a:xfrm>
+          <a:prstGeom prst="straightConnector1">
+            <a:avLst/>
+          </a:prstGeom>
+          <a:ln w="19050">
+            <a:solidFill>
+              <a:schemeClr val="tx1"/>
+            </a:solidFill>
+            <a:prstDash val="solid"/>
+            <a:tailEnd type="triangle"/>
+          </a:ln>
+        </p:spPr>
+        <p:style>
+          <a:lnRef idx="1">
+            <a:schemeClr val="accent1"/>
+          </a:lnRef>
+          <a:fillRef idx="0">
+            <a:schemeClr val="accent1"/>
+          </a:fillRef>
+          <a:effectRef idx="0">
+            <a:schemeClr val="accent1"/>
+          </a:effectRef>
+          <a:fontRef idx="minor">
+            <a:schemeClr val="tx1"/>
+          </a:fontRef>
+        </p:style>
+      </p:cxnSp>
+      <p:sp>
+        <p:nvSpPr>
+          <p:cNvPr id="54" name="Hexagon 53">
+            <a:extLst>
+              <a:ext uri="{FF2B5EF4-FFF2-40B4-BE49-F238E27FC236}">
+                <a16:creationId xmlns:a16="http://schemas.microsoft.com/office/drawing/2014/main" id="{9DD52ED7-5148-67C5-D885-4E2830223613}"/>
+              </a:ext>
+            </a:extLst>
+          </p:cNvPr>
+          <p:cNvSpPr/>
+          <p:nvPr/>
+        </p:nvSpPr>
+        <p:spPr>
+          <a:xfrm>
+            <a:off x="8985236" y="3672163"/>
+            <a:ext cx="2738578" cy="1885727"/>
+          </a:xfrm>
+          <a:prstGeom prst="hexagon">
+            <a:avLst/>
+          </a:prstGeom>
+          <a:solidFill>
+            <a:srgbClr val="C5E0B4"/>
+          </a:solidFill>
+          <a:ln w="47625">
+            <a:solidFill>
+              <a:schemeClr val="accent6">
+                <a:lumMod val="50000"/>
+              </a:schemeClr>
+            </a:solidFill>
+          </a:ln>
+        </p:spPr>
+        <p:style>
+          <a:lnRef idx="2">
+            <a:schemeClr val="accent1">
+              <a:shade val="50000"/>
+            </a:schemeClr>
+          </a:lnRef>
+          <a:fillRef idx="1">
+            <a:schemeClr val="accent1"/>
+          </a:fillRef>
+          <a:effectRef idx="0">
+            <a:schemeClr val="accent1"/>
+          </a:effectRef>
+          <a:fontRef idx="minor">
+            <a:schemeClr val="lt1"/>
+          </a:fontRef>
+        </p:style>
+        <p:txBody>
+          <a:bodyPr rtlCol="0" anchor="ctr"/>
+          <a:lstStyle/>
+          <a:p>
+            <a:pPr algn="ctr"/>
+            <a:r>
+              <a:rPr lang="en-GB" sz="1800" b="1" cap="all" dirty="0">
+                <a:solidFill>
+                  <a:schemeClr val="tx1"/>
+                </a:solidFill>
+                <a:latin typeface="Alte Haas Grotesk" panose="02000503000000020004" pitchFamily="2" charset="0"/>
+              </a:rPr>
+              <a:t>Auditorium </a:t>
+            </a:r>
+            <a:r>
+              <a:rPr lang="en-GB" sz="1800" b="1" cap="all" dirty="0" err="1">
+                <a:solidFill>
+                  <a:schemeClr val="tx1"/>
+                </a:solidFill>
+                <a:latin typeface="Alte Haas Grotesk" panose="02000503000000020004" pitchFamily="2" charset="0"/>
+              </a:rPr>
+              <a:t>seatings</a:t>
+            </a:r>
+            <a:r>
+              <a:rPr lang="en-GB" sz="1800" b="1" cap="all" dirty="0">
+                <a:solidFill>
+                  <a:schemeClr val="tx1"/>
+                </a:solidFill>
+                <a:latin typeface="Alte Haas Grotesk" panose="02000503000000020004" pitchFamily="2" charset="0"/>
+              </a:rPr>
+              <a:t> API</a:t>
+            </a:r>
+            <a:endParaRPr lang="fr-FR" dirty="0">
+              <a:solidFill>
+                <a:schemeClr val="tx1"/>
+              </a:solidFill>
+            </a:endParaRPr>
+          </a:p>
+        </p:txBody>
+      </p:sp>
+      <p:grpSp>
+        <p:nvGrpSpPr>
+          <p:cNvPr id="9" name="Group 8">
+            <a:extLst>
+              <a:ext uri="{FF2B5EF4-FFF2-40B4-BE49-F238E27FC236}">
+                <a16:creationId xmlns:a16="http://schemas.microsoft.com/office/drawing/2014/main" id="{12C75229-5FE5-9C3C-75B6-2803B1934537}"/>
+              </a:ext>
+            </a:extLst>
+          </p:cNvPr>
+          <p:cNvGrpSpPr/>
+          <p:nvPr/>
+        </p:nvGrpSpPr>
+        <p:grpSpPr>
+          <a:xfrm>
+            <a:off x="1185295" y="1169988"/>
+            <a:ext cx="7317239" cy="4795034"/>
+            <a:chOff x="-228725" y="651514"/>
+            <a:chExt cx="7317239" cy="4795034"/>
+          </a:xfrm>
+        </p:grpSpPr>
+        <p:sp>
+          <p:nvSpPr>
+            <p:cNvPr id="35" name="Hexagon 34">
+              <a:extLst>
+                <a:ext uri="{FF2B5EF4-FFF2-40B4-BE49-F238E27FC236}">
+                  <a16:creationId xmlns:a16="http://schemas.microsoft.com/office/drawing/2014/main" id="{33B14C1D-1A7E-737A-1CCD-C4EC7DED6FA1}"/>
+                </a:ext>
+              </a:extLst>
+            </p:cNvPr>
+            <p:cNvSpPr/>
+            <p:nvPr/>
+          </p:nvSpPr>
+          <p:spPr>
+            <a:xfrm>
+              <a:off x="1130412" y="1372282"/>
+              <a:ext cx="5174160" cy="3562815"/>
+            </a:xfrm>
+            <a:prstGeom prst="hexagon">
+              <a:avLst/>
+            </a:prstGeom>
+            <a:solidFill>
+              <a:srgbClr val="DFC9EF"/>
+            </a:solidFill>
+            <a:ln w="47625">
+              <a:solidFill>
+                <a:srgbClr val="7030A0"/>
+              </a:solidFill>
+            </a:ln>
+          </p:spPr>
+          <p:style>
+            <a:lnRef idx="2">
+              <a:schemeClr val="accent1">
+                <a:shade val="50000"/>
+              </a:schemeClr>
+            </a:lnRef>
+            <a:fillRef idx="1">
+              <a:schemeClr val="accent1"/>
+            </a:fillRef>
+            <a:effectRef idx="0">
+              <a:schemeClr val="accent1"/>
+            </a:effectRef>
+            <a:fontRef idx="minor">
+              <a:schemeClr val="lt1"/>
+            </a:fontRef>
+          </p:style>
+          <p:txBody>
+            <a:bodyPr rtlCol="0" anchor="ctr"/>
+            <a:lstStyle/>
+            <a:p>
+              <a:pPr algn="ctr"/>
+              <a:endParaRPr lang="fr-FR"/>
+            </a:p>
+          </p:txBody>
+        </p:sp>
+        <p:sp>
+          <p:nvSpPr>
+            <p:cNvPr id="34" name="Hexagon 33">
+              <a:extLst>
+                <a:ext uri="{FF2B5EF4-FFF2-40B4-BE49-F238E27FC236}">
+                  <a16:creationId xmlns:a16="http://schemas.microsoft.com/office/drawing/2014/main" id="{6A6D51E6-CF65-EF02-1DBB-4E90126E0B31}"/>
+                </a:ext>
+              </a:extLst>
+            </p:cNvPr>
+            <p:cNvSpPr/>
+            <p:nvPr/>
+          </p:nvSpPr>
+          <p:spPr>
+            <a:xfrm>
+              <a:off x="2206827" y="2106919"/>
+              <a:ext cx="3040380" cy="2093540"/>
+            </a:xfrm>
+            <a:prstGeom prst="hexagon">
+              <a:avLst/>
+            </a:prstGeom>
+            <a:solidFill>
+              <a:srgbClr val="BA8CDC"/>
+            </a:solidFill>
+            <a:ln w="28575">
+              <a:solidFill>
+                <a:srgbClr val="7030A0"/>
+              </a:solidFill>
+            </a:ln>
+          </p:spPr>
+          <p:style>
+            <a:lnRef idx="2">
+              <a:schemeClr val="accent1">
+                <a:shade val="50000"/>
+              </a:schemeClr>
+            </a:lnRef>
+            <a:fillRef idx="1">
+              <a:schemeClr val="accent1"/>
+            </a:fillRef>
+            <a:effectRef idx="0">
+              <a:schemeClr val="accent1"/>
+            </a:effectRef>
+            <a:fontRef idx="minor">
+              <a:schemeClr val="lt1"/>
+            </a:fontRef>
+          </p:style>
+          <p:txBody>
+            <a:bodyPr rtlCol="0" anchor="ctr"/>
+            <a:lstStyle/>
+            <a:p>
+              <a:pPr algn="ctr"/>
+              <a:endParaRPr lang="fr-FR"/>
+            </a:p>
+          </p:txBody>
+        </p:sp>
+        <p:grpSp>
+          <p:nvGrpSpPr>
+            <p:cNvPr id="40" name="Group 39">
+              <a:extLst>
+                <a:ext uri="{FF2B5EF4-FFF2-40B4-BE49-F238E27FC236}">
+                  <a16:creationId xmlns:a16="http://schemas.microsoft.com/office/drawing/2014/main" id="{940C4411-4AE3-4C39-3A25-7CA0DDA67A79}"/>
+                </a:ext>
+              </a:extLst>
+            </p:cNvPr>
+            <p:cNvGrpSpPr/>
+            <p:nvPr/>
+          </p:nvGrpSpPr>
+          <p:grpSpPr>
+            <a:xfrm>
+              <a:off x="2457876" y="2594187"/>
+              <a:ext cx="171374" cy="381578"/>
+              <a:chOff x="7689730" y="3195744"/>
+              <a:chExt cx="171374" cy="381578"/>
+            </a:xfrm>
+          </p:grpSpPr>
+          <p:cxnSp>
+            <p:nvCxnSpPr>
+              <p:cNvPr id="36" name="Straight Connector 35">
+                <a:extLst>
+                  <a:ext uri="{FF2B5EF4-FFF2-40B4-BE49-F238E27FC236}">
+                    <a16:creationId xmlns:a16="http://schemas.microsoft.com/office/drawing/2014/main" id="{5C6BA29F-F336-8477-0F22-3890AFCE60EA}"/>
+                  </a:ext>
+                </a:extLst>
+              </p:cNvPr>
+              <p:cNvCxnSpPr>
+                <a:cxnSpLocks/>
+              </p:cNvCxnSpPr>
+              <p:nvPr/>
+            </p:nvCxnSpPr>
+            <p:spPr>
+              <a:xfrm>
+                <a:off x="7775417" y="3367118"/>
+                <a:ext cx="0" cy="210204"/>
+              </a:xfrm>
+              <a:prstGeom prst="line">
+                <a:avLst/>
+              </a:prstGeom>
+              <a:ln w="38100">
+                <a:solidFill>
+                  <a:schemeClr val="tx1"/>
+                </a:solidFill>
+              </a:ln>
+            </p:spPr>
+            <p:style>
+              <a:lnRef idx="1">
+                <a:schemeClr val="accent1"/>
+              </a:lnRef>
+              <a:fillRef idx="0">
+                <a:schemeClr val="accent1"/>
+              </a:fillRef>
+              <a:effectRef idx="0">
+                <a:schemeClr val="accent1"/>
+              </a:effectRef>
+              <a:fontRef idx="minor">
+                <a:schemeClr val="tx1"/>
+              </a:fontRef>
+            </p:style>
+          </p:cxnSp>
+          <p:sp>
+            <p:nvSpPr>
+              <p:cNvPr id="39" name="Oval 38">
+                <a:extLst>
+                  <a:ext uri="{FF2B5EF4-FFF2-40B4-BE49-F238E27FC236}">
+                    <a16:creationId xmlns:a16="http://schemas.microsoft.com/office/drawing/2014/main" id="{EF1A047A-9909-5D12-7282-628EA8ED1B30}"/>
+                  </a:ext>
+                </a:extLst>
+              </p:cNvPr>
+              <p:cNvSpPr/>
+              <p:nvPr/>
+            </p:nvSpPr>
+            <p:spPr>
+              <a:xfrm>
+                <a:off x="7689730" y="3195744"/>
+                <a:ext cx="171374" cy="171374"/>
+              </a:xfrm>
+              <a:prstGeom prst="ellipse">
+                <a:avLst/>
+              </a:prstGeom>
+              <a:solidFill>
+                <a:schemeClr val="bg1"/>
+              </a:solidFill>
+              <a:ln w="19050">
+                <a:solidFill>
+                  <a:schemeClr val="tx1"/>
+                </a:solidFill>
+              </a:ln>
+            </p:spPr>
+            <p:style>
+              <a:lnRef idx="2">
+                <a:schemeClr val="accent1">
+                  <a:shade val="50000"/>
+                </a:schemeClr>
+              </a:lnRef>
+              <a:fillRef idx="1">
+                <a:schemeClr val="accent1"/>
+              </a:fillRef>
+              <a:effectRef idx="0">
+                <a:schemeClr val="accent1"/>
+              </a:effectRef>
+              <a:fontRef idx="minor">
+                <a:schemeClr val="lt1"/>
+              </a:fontRef>
+            </p:style>
+            <p:txBody>
+              <a:bodyPr rtlCol="0" anchor="ctr"/>
+              <a:lstStyle/>
+              <a:p>
+                <a:pPr algn="ctr"/>
+                <a:endParaRPr lang="en-GB"/>
+              </a:p>
+            </p:txBody>
+          </p:sp>
+        </p:grpSp>
+        <p:sp>
+          <p:nvSpPr>
+            <p:cNvPr id="43" name="Rectangle: Rounded Corners 42">
+              <a:extLst>
+                <a:ext uri="{FF2B5EF4-FFF2-40B4-BE49-F238E27FC236}">
+                  <a16:creationId xmlns:a16="http://schemas.microsoft.com/office/drawing/2014/main" id="{CE914DA8-CDC3-DE3A-3738-128639367FC4}"/>
+                </a:ext>
+              </a:extLst>
+            </p:cNvPr>
+            <p:cNvSpPr/>
+            <p:nvPr/>
+          </p:nvSpPr>
+          <p:spPr>
+            <a:xfrm>
+              <a:off x="4005403" y="2890186"/>
+              <a:ext cx="425816" cy="351565"/>
+            </a:xfrm>
+            <a:prstGeom prst="roundRect">
+              <a:avLst/>
+            </a:prstGeom>
+            <a:solidFill>
+              <a:srgbClr val="9A57CD"/>
+            </a:solidFill>
+            <a:ln>
+              <a:solidFill>
+                <a:schemeClr val="tx1"/>
+              </a:solidFill>
+            </a:ln>
+          </p:spPr>
+          <p:style>
+            <a:lnRef idx="2">
+              <a:schemeClr val="accent1">
+                <a:shade val="50000"/>
+              </a:schemeClr>
+            </a:lnRef>
+            <a:fillRef idx="1">
+              <a:schemeClr val="accent1"/>
+            </a:fillRef>
+            <a:effectRef idx="0">
+              <a:schemeClr val="accent1"/>
+            </a:effectRef>
+            <a:fontRef idx="minor">
+              <a:schemeClr val="lt1"/>
+            </a:fontRef>
+          </p:style>
+          <p:txBody>
+            <a:bodyPr rtlCol="0" anchor="ctr"/>
+            <a:lstStyle/>
+            <a:p>
+              <a:pPr algn="ctr"/>
+              <a:endParaRPr lang="en-GB"/>
+            </a:p>
+          </p:txBody>
+        </p:sp>
+        <p:cxnSp>
+          <p:nvCxnSpPr>
+            <p:cNvPr id="44" name="Connector: Elbow 43">
+              <a:extLst>
+                <a:ext uri="{FF2B5EF4-FFF2-40B4-BE49-F238E27FC236}">
+                  <a16:creationId xmlns:a16="http://schemas.microsoft.com/office/drawing/2014/main" id="{80B21C75-7B16-2C9B-F4C3-5F3C6DFDC475}"/>
+                </a:ext>
+              </a:extLst>
+            </p:cNvPr>
+            <p:cNvCxnSpPr>
+              <a:cxnSpLocks/>
+              <a:stCxn id="48" idx="3"/>
+              <a:endCxn id="46" idx="1"/>
+            </p:cNvCxnSpPr>
+            <p:nvPr/>
+          </p:nvCxnSpPr>
+          <p:spPr>
+            <a:xfrm flipV="1">
+              <a:off x="2761180" y="2504092"/>
+              <a:ext cx="604954" cy="612168"/>
+            </a:xfrm>
+            <a:prstGeom prst="bentConnector3">
+              <a:avLst/>
+            </a:prstGeom>
+            <a:ln w="9525">
+              <a:solidFill>
+                <a:schemeClr val="tx1"/>
+              </a:solidFill>
+              <a:tailEnd type="none"/>
+            </a:ln>
+          </p:spPr>
+          <p:style>
+            <a:lnRef idx="1">
+              <a:schemeClr val="accent1"/>
+            </a:lnRef>
+            <a:fillRef idx="0">
+              <a:schemeClr val="accent1"/>
+            </a:fillRef>
+            <a:effectRef idx="0">
+              <a:schemeClr val="accent1"/>
+            </a:effectRef>
+            <a:fontRef idx="minor">
+              <a:schemeClr val="tx1"/>
+            </a:fontRef>
+          </p:style>
+        </p:cxnSp>
+        <p:cxnSp>
+          <p:nvCxnSpPr>
+            <p:cNvPr id="45" name="Connector: Elbow 44">
+              <a:extLst>
+                <a:ext uri="{FF2B5EF4-FFF2-40B4-BE49-F238E27FC236}">
+                  <a16:creationId xmlns:a16="http://schemas.microsoft.com/office/drawing/2014/main" id="{8F16B881-7F02-9320-ABC2-0B490E03D5CA}"/>
+                </a:ext>
+              </a:extLst>
+            </p:cNvPr>
+            <p:cNvCxnSpPr>
+              <a:cxnSpLocks/>
+              <a:stCxn id="46" idx="3"/>
+              <a:endCxn id="43" idx="0"/>
+            </p:cNvCxnSpPr>
+            <p:nvPr/>
+          </p:nvCxnSpPr>
+          <p:spPr>
+            <a:xfrm>
+              <a:off x="3791951" y="2504092"/>
+              <a:ext cx="426360" cy="386094"/>
+            </a:xfrm>
+            <a:prstGeom prst="bentConnector2">
+              <a:avLst/>
+            </a:prstGeom>
+            <a:ln w="9525">
+              <a:solidFill>
+                <a:schemeClr val="tx1"/>
+              </a:solidFill>
+              <a:tailEnd type="none"/>
+            </a:ln>
+          </p:spPr>
+          <p:style>
+            <a:lnRef idx="1">
+              <a:schemeClr val="accent1"/>
+            </a:lnRef>
+            <a:fillRef idx="0">
+              <a:schemeClr val="accent1"/>
+            </a:fillRef>
+            <a:effectRef idx="0">
+              <a:schemeClr val="accent1"/>
+            </a:effectRef>
+            <a:fontRef idx="minor">
+              <a:schemeClr val="tx1"/>
+            </a:fontRef>
+          </p:style>
+        </p:cxnSp>
+        <p:sp>
+          <p:nvSpPr>
+            <p:cNvPr id="46" name="Rectangle: Rounded Corners 45">
+              <a:extLst>
+                <a:ext uri="{FF2B5EF4-FFF2-40B4-BE49-F238E27FC236}">
+                  <a16:creationId xmlns:a16="http://schemas.microsoft.com/office/drawing/2014/main" id="{3BEC7E3D-294F-32B3-0467-8A3ABCBC742D}"/>
+                </a:ext>
+              </a:extLst>
+            </p:cNvPr>
+            <p:cNvSpPr/>
+            <p:nvPr/>
+          </p:nvSpPr>
+          <p:spPr>
+            <a:xfrm>
+              <a:off x="3366134" y="2328309"/>
+              <a:ext cx="425817" cy="351565"/>
+            </a:xfrm>
+            <a:prstGeom prst="roundRect">
+              <a:avLst/>
+            </a:prstGeom>
+            <a:solidFill>
+              <a:srgbClr val="9A57CD"/>
+            </a:solidFill>
+            <a:ln>
+              <a:solidFill>
+                <a:schemeClr val="tx1"/>
+              </a:solidFill>
+            </a:ln>
+          </p:spPr>
+          <p:style>
+            <a:lnRef idx="2">
+              <a:schemeClr val="accent1">
+                <a:shade val="50000"/>
+              </a:schemeClr>
+            </a:lnRef>
+            <a:fillRef idx="1">
+              <a:schemeClr val="accent1"/>
+            </a:fillRef>
+            <a:effectRef idx="0">
+              <a:schemeClr val="accent1"/>
+            </a:effectRef>
+            <a:fontRef idx="minor">
+              <a:schemeClr val="lt1"/>
+            </a:fontRef>
+          </p:style>
+          <p:txBody>
+            <a:bodyPr rtlCol="0" anchor="ctr"/>
+            <a:lstStyle/>
+            <a:p>
+              <a:pPr algn="ctr"/>
+              <a:endParaRPr lang="en-GB"/>
+            </a:p>
+          </p:txBody>
+        </p:sp>
+        <p:sp>
+          <p:nvSpPr>
+            <p:cNvPr id="47" name="Diamond 46">
+              <a:extLst>
+                <a:ext uri="{FF2B5EF4-FFF2-40B4-BE49-F238E27FC236}">
+                  <a16:creationId xmlns:a16="http://schemas.microsoft.com/office/drawing/2014/main" id="{CF1E7E84-BE84-EF72-028C-7C6BE33BBDC3}"/>
+                </a:ext>
+              </a:extLst>
+            </p:cNvPr>
+            <p:cNvSpPr/>
+            <p:nvPr/>
+          </p:nvSpPr>
+          <p:spPr>
+            <a:xfrm>
+              <a:off x="3799194" y="2414175"/>
+              <a:ext cx="167131" cy="167131"/>
+            </a:xfrm>
+            <a:prstGeom prst="diamond">
+              <a:avLst/>
+            </a:prstGeom>
+            <a:solidFill>
+              <a:schemeClr val="tx1"/>
+            </a:solidFill>
+            <a:ln>
+              <a:solidFill>
+                <a:schemeClr val="tx1"/>
+              </a:solidFill>
+            </a:ln>
+          </p:spPr>
+          <p:style>
+            <a:lnRef idx="2">
+              <a:schemeClr val="accent1">
+                <a:shade val="50000"/>
+              </a:schemeClr>
+            </a:lnRef>
+            <a:fillRef idx="1">
+              <a:schemeClr val="accent1"/>
+            </a:fillRef>
+            <a:effectRef idx="0">
+              <a:schemeClr val="accent1"/>
+            </a:effectRef>
+            <a:fontRef idx="minor">
+              <a:schemeClr val="lt1"/>
+            </a:fontRef>
+          </p:style>
+          <p:txBody>
+            <a:bodyPr rtlCol="0" anchor="ctr"/>
+            <a:lstStyle/>
+            <a:p>
+              <a:pPr algn="ctr"/>
+              <a:endParaRPr lang="en-GB"/>
+            </a:p>
+          </p:txBody>
+        </p:sp>
+        <p:sp>
+          <p:nvSpPr>
+            <p:cNvPr id="48" name="Rectangle: Rounded Corners 47">
+              <a:extLst>
+                <a:ext uri="{FF2B5EF4-FFF2-40B4-BE49-F238E27FC236}">
+                  <a16:creationId xmlns:a16="http://schemas.microsoft.com/office/drawing/2014/main" id="{A41AD289-0792-2EA4-E800-3122F9EFFC59}"/>
+                </a:ext>
+              </a:extLst>
+            </p:cNvPr>
+            <p:cNvSpPr/>
+            <p:nvPr/>
+          </p:nvSpPr>
+          <p:spPr>
+            <a:xfrm>
+              <a:off x="2335362" y="2940477"/>
+              <a:ext cx="425818" cy="351565"/>
+            </a:xfrm>
+            <a:prstGeom prst="roundRect">
+              <a:avLst/>
+            </a:prstGeom>
+            <a:solidFill>
+              <a:srgbClr val="9A57CD"/>
+            </a:solidFill>
+            <a:ln>
+              <a:solidFill>
+                <a:schemeClr val="tx1"/>
+              </a:solidFill>
+            </a:ln>
+          </p:spPr>
+          <p:style>
+            <a:lnRef idx="2">
+              <a:schemeClr val="accent1">
+                <a:shade val="50000"/>
+              </a:schemeClr>
+            </a:lnRef>
+            <a:fillRef idx="1">
+              <a:schemeClr val="accent1"/>
+            </a:fillRef>
+            <a:effectRef idx="0">
+              <a:schemeClr val="accent1"/>
+            </a:effectRef>
+            <a:fontRef idx="minor">
+              <a:schemeClr val="lt1"/>
+            </a:fontRef>
+          </p:style>
+          <p:txBody>
+            <a:bodyPr rtlCol="0" anchor="ctr"/>
+            <a:lstStyle/>
+            <a:p>
+              <a:pPr algn="ctr"/>
+              <a:endParaRPr lang="en-GB"/>
+            </a:p>
+          </p:txBody>
+        </p:sp>
+        <p:sp>
+          <p:nvSpPr>
+            <p:cNvPr id="49" name="Diamond 48">
+              <a:extLst>
+                <a:ext uri="{FF2B5EF4-FFF2-40B4-BE49-F238E27FC236}">
+                  <a16:creationId xmlns:a16="http://schemas.microsoft.com/office/drawing/2014/main" id="{BC214A87-C3D5-FF0B-97DE-4DA23A95B490}"/>
+                </a:ext>
+              </a:extLst>
+            </p:cNvPr>
+            <p:cNvSpPr/>
+            <p:nvPr/>
+          </p:nvSpPr>
+          <p:spPr>
+            <a:xfrm>
+              <a:off x="2764551" y="3028958"/>
+              <a:ext cx="167130" cy="167132"/>
+            </a:xfrm>
+            <a:prstGeom prst="diamond">
+              <a:avLst/>
+            </a:prstGeom>
+            <a:solidFill>
+              <a:schemeClr val="tx1"/>
+            </a:solidFill>
+            <a:ln>
+              <a:solidFill>
+                <a:schemeClr val="tx1"/>
+              </a:solidFill>
+            </a:ln>
+          </p:spPr>
+          <p:style>
+            <a:lnRef idx="2">
+              <a:schemeClr val="accent1">
+                <a:shade val="50000"/>
+              </a:schemeClr>
+            </a:lnRef>
+            <a:fillRef idx="1">
+              <a:schemeClr val="accent1"/>
+            </a:fillRef>
+            <a:effectRef idx="0">
+              <a:schemeClr val="accent1"/>
+            </a:effectRef>
+            <a:fontRef idx="minor">
+              <a:schemeClr val="lt1"/>
+            </a:fontRef>
+          </p:style>
+          <p:txBody>
+            <a:bodyPr rtlCol="0" anchor="ctr"/>
+            <a:lstStyle/>
+            <a:p>
+              <a:pPr algn="ctr"/>
+              <a:endParaRPr lang="en-GB"/>
+            </a:p>
+          </p:txBody>
+        </p:sp>
+        <p:sp>
+          <p:nvSpPr>
+            <p:cNvPr id="50" name="Right Brace 49">
+              <a:extLst>
+                <a:ext uri="{FF2B5EF4-FFF2-40B4-BE49-F238E27FC236}">
+                  <a16:creationId xmlns:a16="http://schemas.microsoft.com/office/drawing/2014/main" id="{6933D540-CF40-3B71-81DD-0728A7B7E745}"/>
+                </a:ext>
+              </a:extLst>
+            </p:cNvPr>
+            <p:cNvSpPr/>
+            <p:nvPr/>
+          </p:nvSpPr>
+          <p:spPr>
+            <a:xfrm rot="12414236">
+              <a:off x="5134217" y="3214846"/>
+              <a:ext cx="883655" cy="428062"/>
+            </a:xfrm>
+            <a:prstGeom prst="rightBrace">
+              <a:avLst>
+                <a:gd name="adj1" fmla="val 9622"/>
+                <a:gd name="adj2" fmla="val 54011"/>
+              </a:avLst>
+            </a:prstGeom>
+            <a:ln w="34925">
+              <a:solidFill>
+                <a:schemeClr val="tx1"/>
+              </a:solidFill>
+            </a:ln>
+          </p:spPr>
+          <p:style>
+            <a:lnRef idx="1">
+              <a:schemeClr val="accent1"/>
+            </a:lnRef>
+            <a:fillRef idx="0">
+              <a:schemeClr val="accent1"/>
+            </a:fillRef>
+            <a:effectRef idx="0">
+              <a:schemeClr val="accent1"/>
+            </a:effectRef>
+            <a:fontRef idx="minor">
+              <a:schemeClr val="tx1"/>
+            </a:fontRef>
+          </p:style>
+          <p:txBody>
+            <a:bodyPr rtlCol="0" anchor="ctr"/>
+            <a:lstStyle/>
+            <a:p>
+              <a:pPr algn="ctr"/>
+              <a:endParaRPr lang="en-GB"/>
+            </a:p>
+          </p:txBody>
+        </p:sp>
+        <p:cxnSp>
+          <p:nvCxnSpPr>
+            <p:cNvPr id="51" name="Straight Arrow Connector 50">
+              <a:extLst>
+                <a:ext uri="{FF2B5EF4-FFF2-40B4-BE49-F238E27FC236}">
+                  <a16:creationId xmlns:a16="http://schemas.microsoft.com/office/drawing/2014/main" id="{272ECD37-CF7C-FD44-E585-9389787F552F}"/>
+                </a:ext>
+              </a:extLst>
+            </p:cNvPr>
+            <p:cNvCxnSpPr>
+              <a:cxnSpLocks/>
+              <a:stCxn id="43" idx="3"/>
+              <a:endCxn id="52" idx="1"/>
+            </p:cNvCxnSpPr>
+            <p:nvPr/>
+          </p:nvCxnSpPr>
+          <p:spPr>
+            <a:xfrm>
+              <a:off x="4431219" y="3065969"/>
+              <a:ext cx="634759" cy="60184"/>
+            </a:xfrm>
+            <a:prstGeom prst="straightConnector1">
+              <a:avLst/>
+            </a:prstGeom>
+            <a:ln w="9525">
+              <a:solidFill>
+                <a:schemeClr val="tx1"/>
+              </a:solidFill>
+              <a:prstDash val="dash"/>
+              <a:tailEnd type="triangle"/>
+            </a:ln>
+          </p:spPr>
+          <p:style>
+            <a:lnRef idx="1">
+              <a:schemeClr val="accent1"/>
+            </a:lnRef>
+            <a:fillRef idx="0">
+              <a:schemeClr val="accent1"/>
+            </a:fillRef>
+            <a:effectRef idx="0">
+              <a:schemeClr val="accent1"/>
+            </a:effectRef>
+            <a:fontRef idx="minor">
+              <a:schemeClr val="tx1"/>
+            </a:fontRef>
+          </p:style>
+        </p:cxnSp>
+        <p:sp>
+          <p:nvSpPr>
+            <p:cNvPr id="52" name="Oval 51">
+              <a:extLst>
+                <a:ext uri="{FF2B5EF4-FFF2-40B4-BE49-F238E27FC236}">
+                  <a16:creationId xmlns:a16="http://schemas.microsoft.com/office/drawing/2014/main" id="{213DB660-4E3D-3960-4A63-D7FBF409CF29}"/>
+                </a:ext>
+              </a:extLst>
+            </p:cNvPr>
+            <p:cNvSpPr/>
+            <p:nvPr/>
+          </p:nvSpPr>
+          <p:spPr>
+            <a:xfrm>
+              <a:off x="5040881" y="3101056"/>
+              <a:ext cx="171374" cy="171374"/>
+            </a:xfrm>
+            <a:prstGeom prst="ellipse">
+              <a:avLst/>
+            </a:prstGeom>
+            <a:solidFill>
+              <a:schemeClr val="bg1"/>
+            </a:solidFill>
+            <a:ln w="19050">
+              <a:solidFill>
+                <a:schemeClr val="tx1"/>
+              </a:solidFill>
+            </a:ln>
+          </p:spPr>
+          <p:style>
+            <a:lnRef idx="2">
+              <a:schemeClr val="accent1">
+                <a:shade val="50000"/>
+              </a:schemeClr>
+            </a:lnRef>
+            <a:fillRef idx="1">
+              <a:schemeClr val="accent1"/>
+            </a:fillRef>
+            <a:effectRef idx="0">
+              <a:schemeClr val="accent1"/>
+            </a:effectRef>
+            <a:fontRef idx="minor">
+              <a:schemeClr val="lt1"/>
+            </a:fontRef>
+          </p:style>
+          <p:txBody>
+            <a:bodyPr rtlCol="0" anchor="ctr"/>
+            <a:lstStyle/>
+            <a:p>
+              <a:pPr algn="ctr"/>
+              <a:endParaRPr lang="en-GB"/>
+            </a:p>
+          </p:txBody>
+        </p:sp>
+        <p:sp>
+          <p:nvSpPr>
+            <p:cNvPr id="63" name="Rectangle: Rounded Corners 62">
+              <a:extLst>
+                <a:ext uri="{FF2B5EF4-FFF2-40B4-BE49-F238E27FC236}">
+                  <a16:creationId xmlns:a16="http://schemas.microsoft.com/office/drawing/2014/main" id="{7AC230C3-B6DC-459A-6E3F-2394AB209B41}"/>
+                </a:ext>
+              </a:extLst>
+            </p:cNvPr>
+            <p:cNvSpPr/>
+            <p:nvPr/>
+          </p:nvSpPr>
+          <p:spPr>
+            <a:xfrm>
+              <a:off x="2899680" y="3543024"/>
+              <a:ext cx="425816" cy="351565"/>
+            </a:xfrm>
+            <a:prstGeom prst="roundRect">
+              <a:avLst/>
+            </a:prstGeom>
+            <a:solidFill>
+              <a:srgbClr val="9A57CD"/>
+            </a:solidFill>
+            <a:ln>
+              <a:solidFill>
+                <a:schemeClr val="tx1"/>
+              </a:solidFill>
+            </a:ln>
+          </p:spPr>
+          <p:style>
+            <a:lnRef idx="2">
+              <a:schemeClr val="accent1">
+                <a:shade val="50000"/>
+              </a:schemeClr>
+            </a:lnRef>
+            <a:fillRef idx="1">
+              <a:schemeClr val="accent1"/>
+            </a:fillRef>
+            <a:effectRef idx="0">
+              <a:schemeClr val="accent1"/>
+            </a:effectRef>
+            <a:fontRef idx="minor">
+              <a:schemeClr val="lt1"/>
+            </a:fontRef>
+          </p:style>
+          <p:txBody>
+            <a:bodyPr rtlCol="0" anchor="ctr"/>
+            <a:lstStyle/>
+            <a:p>
+              <a:pPr algn="ctr"/>
+              <a:endParaRPr lang="en-GB"/>
+            </a:p>
+          </p:txBody>
+        </p:sp>
+        <p:sp>
+          <p:nvSpPr>
+            <p:cNvPr id="64" name="Rectangle: Rounded Corners 63">
+              <a:extLst>
+                <a:ext uri="{FF2B5EF4-FFF2-40B4-BE49-F238E27FC236}">
+                  <a16:creationId xmlns:a16="http://schemas.microsoft.com/office/drawing/2014/main" id="{8253828B-6500-05DB-B3F4-DE0CEA08709C}"/>
+                </a:ext>
+              </a:extLst>
+            </p:cNvPr>
+            <p:cNvSpPr/>
+            <p:nvPr/>
+          </p:nvSpPr>
+          <p:spPr>
+            <a:xfrm>
+              <a:off x="3660068" y="3620884"/>
+              <a:ext cx="425816" cy="351565"/>
+            </a:xfrm>
+            <a:prstGeom prst="roundRect">
+              <a:avLst/>
+            </a:prstGeom>
+            <a:solidFill>
+              <a:srgbClr val="9A57CD"/>
+            </a:solidFill>
+            <a:ln>
+              <a:solidFill>
+                <a:schemeClr val="tx1"/>
+              </a:solidFill>
+            </a:ln>
+          </p:spPr>
+          <p:style>
+            <a:lnRef idx="2">
+              <a:schemeClr val="accent1">
+                <a:shade val="50000"/>
+              </a:schemeClr>
+            </a:lnRef>
+            <a:fillRef idx="1">
+              <a:schemeClr val="accent1"/>
+            </a:fillRef>
+            <a:effectRef idx="0">
+              <a:schemeClr val="accent1"/>
+            </a:effectRef>
+            <a:fontRef idx="minor">
+              <a:schemeClr val="lt1"/>
+            </a:fontRef>
+          </p:style>
+          <p:txBody>
+            <a:bodyPr rtlCol="0" anchor="ctr"/>
+            <a:lstStyle/>
+            <a:p>
+              <a:pPr algn="ctr"/>
+              <a:endParaRPr lang="en-GB"/>
+            </a:p>
+          </p:txBody>
+        </p:sp>
+        <p:cxnSp>
+          <p:nvCxnSpPr>
+            <p:cNvPr id="65" name="Connector: Elbow 64">
+              <a:extLst>
+                <a:ext uri="{FF2B5EF4-FFF2-40B4-BE49-F238E27FC236}">
+                  <a16:creationId xmlns:a16="http://schemas.microsoft.com/office/drawing/2014/main" id="{623284CD-18F4-CF51-5F9F-6A6C6563AA46}"/>
+                </a:ext>
+              </a:extLst>
+            </p:cNvPr>
+            <p:cNvCxnSpPr>
+              <a:cxnSpLocks/>
+              <a:stCxn id="63" idx="3"/>
+              <a:endCxn id="64" idx="1"/>
+            </p:cNvCxnSpPr>
+            <p:nvPr/>
+          </p:nvCxnSpPr>
+          <p:spPr>
+            <a:xfrm>
+              <a:off x="3325496" y="3718807"/>
+              <a:ext cx="334572" cy="77860"/>
+            </a:xfrm>
+            <a:prstGeom prst="bentConnector3">
+              <a:avLst>
+                <a:gd name="adj1" fmla="val 57592"/>
+              </a:avLst>
+            </a:prstGeom>
+            <a:ln w="9525">
+              <a:solidFill>
+                <a:schemeClr val="tx1"/>
+              </a:solidFill>
+              <a:tailEnd type="none"/>
+            </a:ln>
+          </p:spPr>
+          <p:style>
+            <a:lnRef idx="1">
+              <a:schemeClr val="accent1"/>
+            </a:lnRef>
+            <a:fillRef idx="0">
+              <a:schemeClr val="accent1"/>
+            </a:fillRef>
+            <a:effectRef idx="0">
+              <a:schemeClr val="accent1"/>
+            </a:effectRef>
+            <a:fontRef idx="minor">
+              <a:schemeClr val="tx1"/>
+            </a:fontRef>
+          </p:style>
+        </p:cxnSp>
+        <p:cxnSp>
+          <p:nvCxnSpPr>
+            <p:cNvPr id="66" name="Straight Arrow Connector 65">
+              <a:extLst>
+                <a:ext uri="{FF2B5EF4-FFF2-40B4-BE49-F238E27FC236}">
+                  <a16:creationId xmlns:a16="http://schemas.microsoft.com/office/drawing/2014/main" id="{4E289FFA-45DA-6FFE-34F0-C4A60E2E3E8F}"/>
+                </a:ext>
+              </a:extLst>
+            </p:cNvPr>
+            <p:cNvCxnSpPr>
+              <a:cxnSpLocks/>
+              <a:stCxn id="48" idx="2"/>
+              <a:endCxn id="63" idx="1"/>
+            </p:cNvCxnSpPr>
+            <p:nvPr/>
+          </p:nvCxnSpPr>
+          <p:spPr>
+            <a:xfrm>
+              <a:off x="2548271" y="3292042"/>
+              <a:ext cx="351409" cy="426765"/>
+            </a:xfrm>
+            <a:prstGeom prst="straightConnector1">
+              <a:avLst/>
+            </a:prstGeom>
+            <a:ln w="9525">
+              <a:solidFill>
+                <a:schemeClr val="tx1"/>
+              </a:solidFill>
+              <a:prstDash val="dash"/>
+              <a:tailEnd type="triangle"/>
+            </a:ln>
+          </p:spPr>
+          <p:style>
+            <a:lnRef idx="1">
+              <a:schemeClr val="accent1"/>
+            </a:lnRef>
+            <a:fillRef idx="0">
+              <a:schemeClr val="accent1"/>
+            </a:fillRef>
+            <a:effectRef idx="0">
+              <a:schemeClr val="accent1"/>
+            </a:effectRef>
+            <a:fontRef idx="minor">
+              <a:schemeClr val="tx1"/>
+            </a:fontRef>
+          </p:style>
+        </p:cxnSp>
+        <p:sp>
+          <p:nvSpPr>
+            <p:cNvPr id="70" name="TextBox 69">
+              <a:extLst>
+                <a:ext uri="{FF2B5EF4-FFF2-40B4-BE49-F238E27FC236}">
+                  <a16:creationId xmlns:a16="http://schemas.microsoft.com/office/drawing/2014/main" id="{F0DC8FA8-A750-E835-50E7-91D1B053EA3E}"/>
+                </a:ext>
+              </a:extLst>
+            </p:cNvPr>
+            <p:cNvSpPr txBox="1"/>
+            <p:nvPr/>
+          </p:nvSpPr>
+          <p:spPr>
+            <a:xfrm>
+              <a:off x="2582958" y="2115294"/>
+              <a:ext cx="2108329" cy="215444"/>
+            </a:xfrm>
+            <a:prstGeom prst="rect">
+              <a:avLst/>
+            </a:prstGeom>
+            <a:noFill/>
+          </p:spPr>
+          <p:txBody>
+            <a:bodyPr wrap="square" rtlCol="0">
+              <a:spAutoFit/>
+            </a:bodyPr>
+            <a:lstStyle/>
+            <a:p>
+              <a:pPr algn="r"/>
+              <a:r>
+                <a:rPr lang="en-GB" sz="800" b="1" cap="all" dirty="0">
+                  <a:latin typeface="Alte Haas Grotesk" panose="02000503000000020004" pitchFamily="2" charset="0"/>
+                </a:rPr>
+                <a:t>Seat suggestions Domain</a:t>
+              </a:r>
+            </a:p>
+          </p:txBody>
+        </p:sp>
+        <p:sp>
+          <p:nvSpPr>
+            <p:cNvPr id="71" name="TextBox 70">
+              <a:extLst>
+                <a:ext uri="{FF2B5EF4-FFF2-40B4-BE49-F238E27FC236}">
+                  <a16:creationId xmlns:a16="http://schemas.microsoft.com/office/drawing/2014/main" id="{36926729-2368-F21C-A7F2-F3D542F577A7}"/>
+                </a:ext>
+              </a:extLst>
+            </p:cNvPr>
+            <p:cNvSpPr txBox="1"/>
+            <p:nvPr/>
+          </p:nvSpPr>
+          <p:spPr>
+            <a:xfrm>
+              <a:off x="3888634" y="1405675"/>
+              <a:ext cx="1523320" cy="272522"/>
+            </a:xfrm>
+            <a:prstGeom prst="rect">
+              <a:avLst/>
+            </a:prstGeom>
+            <a:noFill/>
+          </p:spPr>
+          <p:txBody>
+            <a:bodyPr wrap="square" rtlCol="0">
+              <a:spAutoFit/>
+            </a:bodyPr>
+            <a:lstStyle/>
+            <a:p>
+              <a:pPr algn="r"/>
+              <a:r>
+                <a:rPr lang="en-GB" sz="800" b="1" cap="all" dirty="0">
+                  <a:latin typeface="Alte Haas Grotesk" panose="02000503000000020004" pitchFamily="2" charset="0"/>
+                </a:rPr>
+                <a:t>Infrastructure</a:t>
+              </a:r>
+            </a:p>
+          </p:txBody>
+        </p:sp>
+        <p:pic>
+          <p:nvPicPr>
+            <p:cNvPr id="72" name="Picture 71">
+              <a:extLst>
+                <a:ext uri="{FF2B5EF4-FFF2-40B4-BE49-F238E27FC236}">
+                  <a16:creationId xmlns:a16="http://schemas.microsoft.com/office/drawing/2014/main" id="{7EB3B387-29CE-ED80-CE7F-BA9EBA7FB2A2}"/>
+                </a:ext>
+              </a:extLst>
+            </p:cNvPr>
+            <p:cNvPicPr>
+              <a:picLocks noChangeAspect="1"/>
+            </p:cNvPicPr>
+            <p:nvPr/>
+          </p:nvPicPr>
+          <p:blipFill>
+            <a:blip r:embed="rId2">
+              <a:extLst>
+                <a:ext uri="{28A0092B-C50C-407E-A947-70E740481C1C}">
+                  <a14:useLocalDpi xmlns:a14="http://schemas.microsoft.com/office/drawing/2010/main" val="0"/>
+                </a:ext>
+              </a:extLst>
+            </a:blip>
+            <a:stretch>
+              <a:fillRect/>
+            </a:stretch>
+          </p:blipFill>
+          <p:spPr>
+            <a:xfrm>
+              <a:off x="-228725" y="651514"/>
+              <a:ext cx="696871" cy="656800"/>
+            </a:xfrm>
+            <a:prstGeom prst="rect">
+              <a:avLst/>
+            </a:prstGeom>
+          </p:spPr>
+        </p:pic>
+        <p:cxnSp>
+          <p:nvCxnSpPr>
+            <p:cNvPr id="73" name="Straight Arrow Connector 72">
+              <a:extLst>
+                <a:ext uri="{FF2B5EF4-FFF2-40B4-BE49-F238E27FC236}">
+                  <a16:creationId xmlns:a16="http://schemas.microsoft.com/office/drawing/2014/main" id="{E0BD609C-A372-9B77-A208-61AAF7FAC62E}"/>
+                </a:ext>
+              </a:extLst>
+            </p:cNvPr>
+            <p:cNvCxnSpPr>
+              <a:cxnSpLocks/>
+            </p:cNvCxnSpPr>
+            <p:nvPr/>
+          </p:nvCxnSpPr>
+          <p:spPr>
+            <a:xfrm>
+              <a:off x="447979" y="1267403"/>
+              <a:ext cx="1145077" cy="894772"/>
+            </a:xfrm>
+            <a:prstGeom prst="straightConnector1">
+              <a:avLst/>
+            </a:prstGeom>
+            <a:ln w="19050">
+              <a:solidFill>
+                <a:schemeClr val="tx1"/>
+              </a:solidFill>
+              <a:prstDash val="solid"/>
+              <a:tailEnd type="triangle"/>
+            </a:ln>
+          </p:spPr>
+          <p:style>
+            <a:lnRef idx="1">
+              <a:schemeClr val="accent1"/>
+            </a:lnRef>
+            <a:fillRef idx="0">
+              <a:schemeClr val="accent1"/>
+            </a:fillRef>
+            <a:effectRef idx="0">
+              <a:schemeClr val="accent1"/>
+            </a:effectRef>
+            <a:fontRef idx="minor">
+              <a:schemeClr val="tx1"/>
+            </a:fontRef>
+          </p:style>
+        </p:cxnSp>
+        <p:sp>
+          <p:nvSpPr>
+            <p:cNvPr id="74" name="TextBox 73">
+              <a:extLst>
+                <a:ext uri="{FF2B5EF4-FFF2-40B4-BE49-F238E27FC236}">
+                  <a16:creationId xmlns:a16="http://schemas.microsoft.com/office/drawing/2014/main" id="{39B6EC26-17C9-4060-F3BD-944E655A43B6}"/>
+                </a:ext>
+              </a:extLst>
+            </p:cNvPr>
+            <p:cNvSpPr txBox="1"/>
+            <p:nvPr/>
+          </p:nvSpPr>
+          <p:spPr>
+            <a:xfrm>
+              <a:off x="756465" y="1541936"/>
+              <a:ext cx="487634" cy="230832"/>
+            </a:xfrm>
+            <a:prstGeom prst="rect">
+              <a:avLst/>
+            </a:prstGeom>
+            <a:solidFill>
+              <a:srgbClr val="FBE5D6"/>
+            </a:solidFill>
+          </p:spPr>
+          <p:txBody>
+            <a:bodyPr wrap="none" rtlCol="0">
+              <a:spAutoFit/>
+            </a:bodyPr>
+            <a:lstStyle>
+              <a:defPPr>
+                <a:defRPr lang="fr-FR"/>
+              </a:defPPr>
+              <a:lvl1pPr>
+                <a:defRPr sz="900" b="1">
+                  <a:latin typeface="Alte Haas Grotesk" panose="02000503000000020004" pitchFamily="2" charset="0"/>
+                </a:defRPr>
+              </a:lvl1pPr>
+            </a:lstStyle>
+            <a:p>
+              <a:r>
+                <a:rPr lang="fr-FR" dirty="0"/>
+                <a:t>HTTP</a:t>
+              </a:r>
+              <a:endParaRPr lang="en-GB" dirty="0"/>
+            </a:p>
+          </p:txBody>
+        </p:sp>
+        <p:sp>
+          <p:nvSpPr>
+            <p:cNvPr id="85" name="Right Brace 84">
+              <a:extLst>
+                <a:ext uri="{FF2B5EF4-FFF2-40B4-BE49-F238E27FC236}">
+                  <a16:creationId xmlns:a16="http://schemas.microsoft.com/office/drawing/2014/main" id="{ECBCF79C-DB7C-8437-A8D1-79A66D6A3034}"/>
+                </a:ext>
+              </a:extLst>
+            </p:cNvPr>
+            <p:cNvSpPr/>
+            <p:nvPr/>
+          </p:nvSpPr>
+          <p:spPr>
+            <a:xfrm rot="12414236">
+              <a:off x="4725358" y="4000552"/>
+              <a:ext cx="883655" cy="428062"/>
+            </a:xfrm>
+            <a:prstGeom prst="rightBrace">
+              <a:avLst>
+                <a:gd name="adj1" fmla="val 9622"/>
+                <a:gd name="adj2" fmla="val 54011"/>
+              </a:avLst>
+            </a:prstGeom>
+            <a:ln w="34925">
+              <a:solidFill>
+                <a:schemeClr val="tx1"/>
+              </a:solidFill>
+            </a:ln>
+          </p:spPr>
+          <p:style>
+            <a:lnRef idx="1">
+              <a:schemeClr val="accent1"/>
+            </a:lnRef>
+            <a:fillRef idx="0">
+              <a:schemeClr val="accent1"/>
+            </a:fillRef>
+            <a:effectRef idx="0">
+              <a:schemeClr val="accent1"/>
+            </a:effectRef>
+            <a:fontRef idx="minor">
+              <a:schemeClr val="tx1"/>
+            </a:fontRef>
+          </p:style>
+          <p:txBody>
+            <a:bodyPr rtlCol="0" anchor="ctr"/>
+            <a:lstStyle/>
+            <a:p>
+              <a:pPr algn="ctr"/>
+              <a:endParaRPr lang="en-GB"/>
+            </a:p>
+          </p:txBody>
+        </p:sp>
+        <p:sp>
+          <p:nvSpPr>
+            <p:cNvPr id="86" name="Oval 85">
+              <a:extLst>
+                <a:ext uri="{FF2B5EF4-FFF2-40B4-BE49-F238E27FC236}">
+                  <a16:creationId xmlns:a16="http://schemas.microsoft.com/office/drawing/2014/main" id="{EFB2C063-5C64-7717-7CF4-F13A7821C2FA}"/>
+                </a:ext>
+              </a:extLst>
+            </p:cNvPr>
+            <p:cNvSpPr/>
+            <p:nvPr/>
+          </p:nvSpPr>
+          <p:spPr>
+            <a:xfrm>
+              <a:off x="4632022" y="3886762"/>
+              <a:ext cx="171374" cy="171374"/>
+            </a:xfrm>
+            <a:prstGeom prst="ellipse">
+              <a:avLst/>
+            </a:prstGeom>
+            <a:solidFill>
+              <a:schemeClr val="bg1"/>
+            </a:solidFill>
+            <a:ln w="19050">
+              <a:solidFill>
+                <a:schemeClr val="tx1"/>
+              </a:solidFill>
+            </a:ln>
+          </p:spPr>
+          <p:style>
+            <a:lnRef idx="2">
+              <a:schemeClr val="accent1">
+                <a:shade val="50000"/>
+              </a:schemeClr>
+            </a:lnRef>
+            <a:fillRef idx="1">
+              <a:schemeClr val="accent1"/>
+            </a:fillRef>
+            <a:effectRef idx="0">
+              <a:schemeClr val="accent1"/>
+            </a:effectRef>
+            <a:fontRef idx="minor">
+              <a:schemeClr val="lt1"/>
+            </a:fontRef>
+          </p:style>
+          <p:txBody>
+            <a:bodyPr rtlCol="0" anchor="ctr"/>
+            <a:lstStyle/>
+            <a:p>
+              <a:pPr algn="ctr"/>
+              <a:endParaRPr lang="en-GB"/>
+            </a:p>
+          </p:txBody>
+        </p:sp>
+        <p:sp>
+          <p:nvSpPr>
+            <p:cNvPr id="84" name="Rectangle 83">
+              <a:extLst>
+                <a:ext uri="{FF2B5EF4-FFF2-40B4-BE49-F238E27FC236}">
+                  <a16:creationId xmlns:a16="http://schemas.microsoft.com/office/drawing/2014/main" id="{DC2D66E4-746D-C29C-9C6E-03E99FEE3A62}"/>
+                </a:ext>
+              </a:extLst>
+            </p:cNvPr>
+            <p:cNvSpPr/>
+            <p:nvPr/>
+          </p:nvSpPr>
+          <p:spPr>
+            <a:xfrm rot="17820000">
+              <a:off x="4959075" y="4081501"/>
+              <a:ext cx="823899" cy="546311"/>
+            </a:xfrm>
+            <a:prstGeom prst="rect">
+              <a:avLst/>
+            </a:prstGeom>
+            <a:solidFill>
+              <a:schemeClr val="accent4">
+                <a:lumMod val="60000"/>
+                <a:lumOff val="40000"/>
+              </a:schemeClr>
+            </a:solidFill>
+            <a:ln w="25400">
+              <a:solidFill>
+                <a:schemeClr val="tx1"/>
+              </a:solidFill>
+            </a:ln>
+          </p:spPr>
+          <p:style>
+            <a:lnRef idx="2">
+              <a:schemeClr val="accent1">
+                <a:shade val="50000"/>
+              </a:schemeClr>
+            </a:lnRef>
+            <a:fillRef idx="1">
+              <a:schemeClr val="accent1"/>
+            </a:fillRef>
+            <a:effectRef idx="0">
+              <a:schemeClr val="accent1"/>
+            </a:effectRef>
+            <a:fontRef idx="minor">
+              <a:schemeClr val="lt1"/>
+            </a:fontRef>
+          </p:style>
+          <p:txBody>
+            <a:bodyPr rtlCol="0" anchor="ctr"/>
+            <a:lstStyle/>
+            <a:p>
+              <a:pPr algn="ctr"/>
+              <a:r>
+                <a:rPr lang="fr-FR" sz="900" cap="all" dirty="0">
+                  <a:solidFill>
+                    <a:schemeClr val="tx1"/>
+                  </a:solidFill>
+                </a:rPr>
+                <a:t>Repository (Adapter)</a:t>
+              </a:r>
+              <a:endParaRPr lang="en-GB" sz="900" cap="all" dirty="0">
+                <a:solidFill>
+                  <a:schemeClr val="tx1"/>
+                </a:solidFill>
+              </a:endParaRPr>
+            </a:p>
+          </p:txBody>
+        </p:sp>
+        <p:cxnSp>
+          <p:nvCxnSpPr>
+            <p:cNvPr id="94" name="Straight Arrow Connector 93">
+              <a:extLst>
+                <a:ext uri="{FF2B5EF4-FFF2-40B4-BE49-F238E27FC236}">
+                  <a16:creationId xmlns:a16="http://schemas.microsoft.com/office/drawing/2014/main" id="{6264A4D3-64FF-9EDF-3633-89AB523BA0D2}"/>
+                </a:ext>
+              </a:extLst>
+            </p:cNvPr>
+            <p:cNvCxnSpPr>
+              <a:cxnSpLocks/>
+              <a:stCxn id="64" idx="3"/>
+              <a:endCxn id="86" idx="2"/>
+            </p:cNvCxnSpPr>
+            <p:nvPr/>
+          </p:nvCxnSpPr>
+          <p:spPr>
+            <a:xfrm>
+              <a:off x="4085884" y="3796667"/>
+              <a:ext cx="546138" cy="175782"/>
+            </a:xfrm>
+            <a:prstGeom prst="straightConnector1">
+              <a:avLst/>
+            </a:prstGeom>
+            <a:ln w="9525">
+              <a:solidFill>
+                <a:schemeClr val="tx1"/>
+              </a:solidFill>
+              <a:prstDash val="dash"/>
+              <a:tailEnd type="triangle"/>
+            </a:ln>
+          </p:spPr>
+          <p:style>
+            <a:lnRef idx="1">
+              <a:schemeClr val="accent1"/>
+            </a:lnRef>
+            <a:fillRef idx="0">
+              <a:schemeClr val="accent1"/>
+            </a:fillRef>
+            <a:effectRef idx="0">
+              <a:schemeClr val="accent1"/>
+            </a:effectRef>
+            <a:fontRef idx="minor">
+              <a:schemeClr val="tx1"/>
+            </a:fontRef>
+          </p:style>
+        </p:cxnSp>
+        <p:sp>
+          <p:nvSpPr>
+            <p:cNvPr id="100" name="Diamond 99">
+              <a:extLst>
+                <a:ext uri="{FF2B5EF4-FFF2-40B4-BE49-F238E27FC236}">
+                  <a16:creationId xmlns:a16="http://schemas.microsoft.com/office/drawing/2014/main" id="{6CA5F1AF-7106-D0E4-AB41-41734719A651}"/>
+                </a:ext>
+              </a:extLst>
+            </p:cNvPr>
+            <p:cNvSpPr/>
+            <p:nvPr/>
+          </p:nvSpPr>
+          <p:spPr>
+            <a:xfrm>
+              <a:off x="3332536" y="3640001"/>
+              <a:ext cx="167131" cy="167131"/>
+            </a:xfrm>
+            <a:prstGeom prst="diamond">
+              <a:avLst/>
+            </a:prstGeom>
+            <a:solidFill>
+              <a:schemeClr val="tx1"/>
+            </a:solidFill>
+            <a:ln>
+              <a:solidFill>
+                <a:schemeClr val="tx1"/>
+              </a:solidFill>
+            </a:ln>
+          </p:spPr>
+          <p:style>
+            <a:lnRef idx="2">
+              <a:schemeClr val="accent1">
+                <a:shade val="50000"/>
+              </a:schemeClr>
+            </a:lnRef>
+            <a:fillRef idx="1">
+              <a:schemeClr val="accent1"/>
+            </a:fillRef>
+            <a:effectRef idx="0">
+              <a:schemeClr val="accent1"/>
+            </a:effectRef>
+            <a:fontRef idx="minor">
+              <a:schemeClr val="lt1"/>
+            </a:fontRef>
+          </p:style>
+          <p:txBody>
+            <a:bodyPr rtlCol="0" anchor="ctr"/>
+            <a:lstStyle/>
+            <a:p>
+              <a:pPr algn="ctr"/>
+              <a:endParaRPr lang="en-GB"/>
+            </a:p>
+          </p:txBody>
+        </p:sp>
+        <p:sp>
+          <p:nvSpPr>
+            <p:cNvPr id="102" name="Flowchart: Magnetic Disk 101">
+              <a:extLst>
+                <a:ext uri="{FF2B5EF4-FFF2-40B4-BE49-F238E27FC236}">
+                  <a16:creationId xmlns:a16="http://schemas.microsoft.com/office/drawing/2014/main" id="{8809B9B3-2ABA-7002-C465-823660F01F15}"/>
+                </a:ext>
+              </a:extLst>
+            </p:cNvPr>
+            <p:cNvSpPr/>
+            <p:nvPr/>
+          </p:nvSpPr>
+          <p:spPr>
+            <a:xfrm>
+              <a:off x="6449037" y="4738570"/>
+              <a:ext cx="504521" cy="707978"/>
+            </a:xfrm>
+            <a:prstGeom prst="flowChartMagneticDisk">
+              <a:avLst/>
+            </a:prstGeom>
+            <a:solidFill>
+              <a:srgbClr val="DFC9EF"/>
+            </a:solidFill>
+            <a:ln w="25400">
+              <a:solidFill>
+                <a:srgbClr val="7030A0"/>
+              </a:solidFill>
+            </a:ln>
+          </p:spPr>
+          <p:style>
+            <a:lnRef idx="2">
+              <a:schemeClr val="accent1">
+                <a:shade val="50000"/>
+              </a:schemeClr>
+            </a:lnRef>
+            <a:fillRef idx="1">
+              <a:schemeClr val="accent1"/>
+            </a:fillRef>
+            <a:effectRef idx="0">
+              <a:schemeClr val="accent1"/>
+            </a:effectRef>
+            <a:fontRef idx="minor">
+              <a:schemeClr val="lt1"/>
+            </a:fontRef>
+          </p:style>
+          <p:txBody>
+            <a:bodyPr rtlCol="0" anchor="ctr"/>
+            <a:lstStyle/>
+            <a:p>
+              <a:pPr algn="ctr"/>
+              <a:r>
+                <a:rPr lang="fr-FR" sz="1400" b="1" cap="all" dirty="0" err="1">
+                  <a:solidFill>
+                    <a:schemeClr val="tx1"/>
+                  </a:solidFill>
+                  <a:latin typeface="Alte Haas Grotesk" panose="02000503000000020004" pitchFamily="2" charset="0"/>
+                </a:rPr>
+                <a:t>db</a:t>
+              </a:r>
+              <a:endParaRPr lang="fr-FR" sz="1400" b="1" cap="all" dirty="0">
+                <a:solidFill>
+                  <a:schemeClr val="tx1"/>
+                </a:solidFill>
+                <a:latin typeface="Alte Haas Grotesk" panose="02000503000000020004" pitchFamily="2" charset="0"/>
+              </a:endParaRPr>
+            </a:p>
+          </p:txBody>
+        </p:sp>
+        <p:cxnSp>
+          <p:nvCxnSpPr>
+            <p:cNvPr id="103" name="Straight Arrow Connector 102">
+              <a:extLst>
+                <a:ext uri="{FF2B5EF4-FFF2-40B4-BE49-F238E27FC236}">
+                  <a16:creationId xmlns:a16="http://schemas.microsoft.com/office/drawing/2014/main" id="{9DC579C9-2B02-64AB-2FBD-5421A8699E3D}"/>
+                </a:ext>
+              </a:extLst>
+            </p:cNvPr>
+            <p:cNvCxnSpPr>
+              <a:cxnSpLocks/>
+              <a:stCxn id="84" idx="2"/>
+              <a:endCxn id="102" idx="2"/>
+            </p:cNvCxnSpPr>
+            <p:nvPr/>
+          </p:nvCxnSpPr>
+          <p:spPr>
+            <a:xfrm>
+              <a:off x="5614408" y="4478666"/>
+              <a:ext cx="834629" cy="613893"/>
+            </a:xfrm>
+            <a:prstGeom prst="straightConnector1">
+              <a:avLst/>
+            </a:prstGeom>
+            <a:ln w="19050">
+              <a:solidFill>
+                <a:schemeClr val="tx1"/>
+              </a:solidFill>
+              <a:prstDash val="solid"/>
+              <a:tailEnd type="triangle"/>
+            </a:ln>
+          </p:spPr>
+          <p:style>
+            <a:lnRef idx="1">
+              <a:schemeClr val="accent1"/>
+            </a:lnRef>
+            <a:fillRef idx="0">
+              <a:schemeClr val="accent1"/>
+            </a:fillRef>
+            <a:effectRef idx="0">
+              <a:schemeClr val="accent1"/>
+            </a:effectRef>
+            <a:fontRef idx="minor">
+              <a:schemeClr val="tx1"/>
+            </a:fontRef>
+          </p:style>
+        </p:cxnSp>
+        <p:sp>
+          <p:nvSpPr>
+            <p:cNvPr id="109" name="TextBox 108">
+              <a:extLst>
+                <a:ext uri="{FF2B5EF4-FFF2-40B4-BE49-F238E27FC236}">
+                  <a16:creationId xmlns:a16="http://schemas.microsoft.com/office/drawing/2014/main" id="{35FD09CB-1EA0-C721-B9D5-8B0814D9365D}"/>
+                </a:ext>
+              </a:extLst>
+            </p:cNvPr>
+            <p:cNvSpPr txBox="1"/>
+            <p:nvPr/>
+          </p:nvSpPr>
+          <p:spPr>
+            <a:xfrm>
+              <a:off x="2047278" y="4991066"/>
+              <a:ext cx="3338271" cy="369332"/>
+            </a:xfrm>
+            <a:prstGeom prst="rect">
+              <a:avLst/>
+            </a:prstGeom>
+            <a:noFill/>
+          </p:spPr>
+          <p:txBody>
+            <a:bodyPr wrap="square" rtlCol="0">
+              <a:spAutoFit/>
+            </a:bodyPr>
+            <a:lstStyle/>
+            <a:p>
+              <a:pPr algn="ctr"/>
+              <a:r>
+                <a:rPr lang="en-GB" b="1" cap="all" dirty="0">
+                  <a:solidFill>
+                    <a:srgbClr val="C00000"/>
+                  </a:solidFill>
+                  <a:latin typeface="Alte Haas Grotesk" panose="02000503000000020004" pitchFamily="2" charset="0"/>
+                </a:rPr>
+                <a:t>Seat </a:t>
+              </a:r>
+              <a:r>
+                <a:rPr lang="en-GB" b="1" cap="all" dirty="0" err="1">
+                  <a:solidFill>
+                    <a:srgbClr val="C00000"/>
+                  </a:solidFill>
+                  <a:latin typeface="Alte Haas Grotesk" panose="02000503000000020004" pitchFamily="2" charset="0"/>
+                </a:rPr>
+                <a:t>SuggestionS</a:t>
+              </a:r>
+              <a:r>
+                <a:rPr lang="en-GB" b="1" cap="all" dirty="0">
+                  <a:solidFill>
+                    <a:srgbClr val="C00000"/>
+                  </a:solidFill>
+                  <a:latin typeface="Alte Haas Grotesk" panose="02000503000000020004" pitchFamily="2" charset="0"/>
+                </a:rPr>
+                <a:t> API</a:t>
+              </a:r>
+            </a:p>
+          </p:txBody>
+        </p:sp>
+        <p:sp>
+          <p:nvSpPr>
+            <p:cNvPr id="216" name="Rectangle 215">
+              <a:extLst>
+                <a:ext uri="{FF2B5EF4-FFF2-40B4-BE49-F238E27FC236}">
+                  <a16:creationId xmlns:a16="http://schemas.microsoft.com/office/drawing/2014/main" id="{B4EA41F1-A440-2F90-8DE8-61CF29EE04C4}"/>
+                </a:ext>
+              </a:extLst>
+            </p:cNvPr>
+            <p:cNvSpPr/>
+            <p:nvPr/>
+          </p:nvSpPr>
+          <p:spPr>
+            <a:xfrm rot="17820000">
+              <a:off x="5411476" y="3179914"/>
+              <a:ext cx="824437" cy="546311"/>
+            </a:xfrm>
+            <a:prstGeom prst="rect">
+              <a:avLst/>
+            </a:prstGeom>
+            <a:solidFill>
+              <a:srgbClr val="FFD966"/>
+            </a:solidFill>
+            <a:ln w="25400">
+              <a:solidFill>
+                <a:schemeClr val="tx1"/>
+              </a:solidFill>
+            </a:ln>
+          </p:spPr>
+          <p:style>
+            <a:lnRef idx="2">
+              <a:schemeClr val="accent1">
+                <a:shade val="50000"/>
+              </a:schemeClr>
+            </a:lnRef>
+            <a:fillRef idx="1">
+              <a:schemeClr val="accent1"/>
+            </a:fillRef>
+            <a:effectRef idx="0">
+              <a:schemeClr val="accent1"/>
+            </a:effectRef>
+            <a:fontRef idx="minor">
+              <a:schemeClr val="lt1"/>
+            </a:fontRef>
+          </p:style>
+          <p:txBody>
+            <a:bodyPr rtlCol="0" anchor="ctr"/>
+            <a:lstStyle/>
+            <a:p>
+              <a:pPr algn="ctr"/>
+              <a:r>
+                <a:rPr lang="fr-FR" sz="900" cap="all" dirty="0">
+                  <a:solidFill>
+                    <a:schemeClr val="tx1"/>
+                  </a:solidFill>
+                </a:rPr>
+                <a:t>Auditorium </a:t>
+              </a:r>
+              <a:r>
+                <a:rPr lang="fr-FR" sz="900" cap="all" dirty="0" err="1">
+                  <a:solidFill>
+                    <a:schemeClr val="tx1"/>
+                  </a:solidFill>
+                </a:rPr>
+                <a:t>seating</a:t>
+              </a:r>
+              <a:r>
+                <a:rPr lang="fr-FR" sz="900" cap="all" dirty="0">
+                  <a:solidFill>
+                    <a:schemeClr val="tx1"/>
+                  </a:solidFill>
+                </a:rPr>
+                <a:t> web Adapter</a:t>
+              </a:r>
+              <a:endParaRPr lang="en-GB" sz="900" cap="all" dirty="0">
+                <a:solidFill>
+                  <a:schemeClr val="tx1"/>
+                </a:solidFill>
+              </a:endParaRPr>
+            </a:p>
+          </p:txBody>
+        </p:sp>
+        <p:cxnSp>
+          <p:nvCxnSpPr>
+            <p:cNvPr id="159" name="Straight Arrow Connector 158">
+              <a:extLst>
+                <a:ext uri="{FF2B5EF4-FFF2-40B4-BE49-F238E27FC236}">
+                  <a16:creationId xmlns:a16="http://schemas.microsoft.com/office/drawing/2014/main" id="{482C9FBF-083C-E03A-1E91-7D0E1A3E8928}"/>
+                </a:ext>
+              </a:extLst>
+            </p:cNvPr>
+            <p:cNvCxnSpPr>
+              <a:cxnSpLocks/>
+              <a:stCxn id="160" idx="2"/>
+            </p:cNvCxnSpPr>
+            <p:nvPr/>
+          </p:nvCxnSpPr>
+          <p:spPr>
+            <a:xfrm>
+              <a:off x="2082406" y="2316045"/>
+              <a:ext cx="400567" cy="303239"/>
+            </a:xfrm>
+            <a:prstGeom prst="straightConnector1">
+              <a:avLst/>
+            </a:prstGeom>
+            <a:ln w="38100">
+              <a:solidFill>
+                <a:srgbClr val="C00000"/>
+              </a:solidFill>
+              <a:prstDash val="sysDash"/>
+              <a:tailEnd type="triangle"/>
+            </a:ln>
+          </p:spPr>
+          <p:style>
+            <a:lnRef idx="1">
+              <a:schemeClr val="accent1"/>
+            </a:lnRef>
+            <a:fillRef idx="0">
+              <a:schemeClr val="accent1"/>
+            </a:fillRef>
+            <a:effectRef idx="0">
+              <a:schemeClr val="accent1"/>
+            </a:effectRef>
+            <a:fontRef idx="minor">
+              <a:schemeClr val="tx1"/>
+            </a:fontRef>
+          </p:style>
+        </p:cxnSp>
+        <p:sp>
+          <p:nvSpPr>
+            <p:cNvPr id="160" name="Rectangle 159">
+              <a:extLst>
+                <a:ext uri="{FF2B5EF4-FFF2-40B4-BE49-F238E27FC236}">
+                  <a16:creationId xmlns:a16="http://schemas.microsoft.com/office/drawing/2014/main" id="{E6B81530-3AF7-F7F1-E6D2-30E2FCEF1862}"/>
+                </a:ext>
+              </a:extLst>
+            </p:cNvPr>
+            <p:cNvSpPr/>
+            <p:nvPr/>
+          </p:nvSpPr>
+          <p:spPr>
+            <a:xfrm rot="17798078">
+              <a:off x="1343693" y="1999023"/>
+              <a:ext cx="1086095" cy="437786"/>
+            </a:xfrm>
+            <a:prstGeom prst="rect">
+              <a:avLst/>
+            </a:prstGeom>
+            <a:solidFill>
+              <a:schemeClr val="accent4">
+                <a:lumMod val="60000"/>
+                <a:lumOff val="40000"/>
+              </a:schemeClr>
+            </a:solidFill>
+            <a:ln w="25400">
+              <a:solidFill>
+                <a:schemeClr val="tx1"/>
+              </a:solidFill>
+            </a:ln>
+          </p:spPr>
+          <p:style>
+            <a:lnRef idx="2">
+              <a:schemeClr val="accent1">
+                <a:shade val="50000"/>
+              </a:schemeClr>
+            </a:lnRef>
+            <a:fillRef idx="1">
+              <a:schemeClr val="accent1"/>
+            </a:fillRef>
+            <a:effectRef idx="0">
+              <a:schemeClr val="accent1"/>
+            </a:effectRef>
+            <a:fontRef idx="minor">
+              <a:schemeClr val="lt1"/>
+            </a:fontRef>
+          </p:style>
+          <p:txBody>
+            <a:bodyPr rtlCol="0" anchor="ctr"/>
+            <a:lstStyle/>
+            <a:p>
+              <a:pPr algn="ctr"/>
+              <a:r>
+                <a:rPr lang="fr-FR" sz="900" cap="all" dirty="0" err="1">
+                  <a:solidFill>
+                    <a:schemeClr val="tx1"/>
+                  </a:solidFill>
+                </a:rPr>
+                <a:t>WebController</a:t>
+              </a:r>
+              <a:r>
+                <a:rPr lang="fr-FR" sz="900" cap="all" dirty="0">
+                  <a:solidFill>
+                    <a:schemeClr val="tx1"/>
+                  </a:solidFill>
+                </a:rPr>
+                <a:t> (Adapter)</a:t>
+              </a:r>
+              <a:endParaRPr lang="en-GB" sz="900" cap="all" dirty="0">
+                <a:solidFill>
+                  <a:schemeClr val="tx1"/>
+                </a:solidFill>
+              </a:endParaRPr>
+            </a:p>
+          </p:txBody>
+        </p:sp>
+        <p:sp>
+          <p:nvSpPr>
+            <p:cNvPr id="161" name="TextBox 160">
+              <a:extLst>
+                <a:ext uri="{FF2B5EF4-FFF2-40B4-BE49-F238E27FC236}">
+                  <a16:creationId xmlns:a16="http://schemas.microsoft.com/office/drawing/2014/main" id="{7F5086DF-C070-E37B-B057-56181D96B9DE}"/>
+                </a:ext>
+              </a:extLst>
+            </p:cNvPr>
+            <p:cNvSpPr txBox="1"/>
+            <p:nvPr/>
+          </p:nvSpPr>
+          <p:spPr>
+            <a:xfrm>
+              <a:off x="2078667" y="2152354"/>
+              <a:ext cx="618793" cy="215444"/>
+            </a:xfrm>
+            <a:prstGeom prst="rect">
+              <a:avLst/>
+            </a:prstGeom>
+            <a:noFill/>
+          </p:spPr>
+          <p:txBody>
+            <a:bodyPr wrap="square" rtlCol="0">
+              <a:spAutoFit/>
+            </a:bodyPr>
+            <a:lstStyle/>
+            <a:p>
+              <a:r>
+                <a:rPr lang="fr-FR" sz="800" b="1" dirty="0">
+                  <a:solidFill>
+                    <a:srgbClr val="C00000"/>
+                  </a:solidFill>
+                  <a:latin typeface="Alte Haas Grotesk" panose="02000503000000020004" pitchFamily="2" charset="0"/>
+                </a:rPr>
+                <a:t>(in proc)</a:t>
+              </a:r>
+              <a:endParaRPr lang="en-GB" sz="800" b="1" dirty="0">
+                <a:solidFill>
+                  <a:srgbClr val="C00000"/>
+                </a:solidFill>
+                <a:latin typeface="Alte Haas Grotesk" panose="02000503000000020004" pitchFamily="2" charset="0"/>
+              </a:endParaRPr>
+            </a:p>
+          </p:txBody>
+        </p:sp>
+        <p:sp>
+          <p:nvSpPr>
+            <p:cNvPr id="134" name="TextBox 133">
+              <a:extLst>
+                <a:ext uri="{FF2B5EF4-FFF2-40B4-BE49-F238E27FC236}">
+                  <a16:creationId xmlns:a16="http://schemas.microsoft.com/office/drawing/2014/main" id="{CCB73EF0-935D-80FD-0DA6-10CCD5AA72D7}"/>
+                </a:ext>
+              </a:extLst>
+            </p:cNvPr>
+            <p:cNvSpPr txBox="1"/>
+            <p:nvPr/>
+          </p:nvSpPr>
+          <p:spPr>
+            <a:xfrm>
+              <a:off x="6600880" y="3691716"/>
+              <a:ext cx="487634" cy="230832"/>
+            </a:xfrm>
+            <a:prstGeom prst="rect">
+              <a:avLst/>
+            </a:prstGeom>
+            <a:solidFill>
+              <a:srgbClr val="FBE5D6"/>
+            </a:solidFill>
+          </p:spPr>
+          <p:txBody>
+            <a:bodyPr wrap="none" rtlCol="0">
+              <a:spAutoFit/>
+            </a:bodyPr>
+            <a:lstStyle/>
+            <a:p>
+              <a:r>
+                <a:rPr lang="fr-FR" sz="900" b="1" dirty="0">
+                  <a:latin typeface="Alte Haas Grotesk" panose="02000503000000020004" pitchFamily="2" charset="0"/>
+                </a:rPr>
+                <a:t>HTTP</a:t>
+              </a:r>
+              <a:endParaRPr lang="en-GB" sz="900" b="1" dirty="0">
+                <a:latin typeface="Alte Haas Grotesk" panose="02000503000000020004" pitchFamily="2" charset="0"/>
+              </a:endParaRPr>
+            </a:p>
+          </p:txBody>
+        </p:sp>
+      </p:grpSp>
+    </p:spTree>
+    <p:extLst>
+      <p:ext uri="{BB962C8B-B14F-4D97-AF65-F5344CB8AC3E}">
+        <p14:creationId xmlns:p14="http://schemas.microsoft.com/office/powerpoint/2010/main" val="287874265"/>
+      </p:ext>
+    </p:extLst>
+  </p:cSld>
+  <p:clrMapOvr>
+    <a:masterClrMapping/>
+  </p:clrMapOvr>
+</p:sld>
+</file>
+
+<file path=ppt/slides/slide7.xml><?xml version="1.0" encoding="utf-8"?>
+<p:sld xmlns:a="http://schemas.openxmlformats.org/drawingml/2006/main" xmlns:r="http://schemas.openxmlformats.org/officeDocument/2006/relationships" xmlns:p="http://schemas.openxmlformats.org/presentationml/2006/main">
+  <p:cSld>
+    <p:bg>
+      <p:bgPr>
+        <a:solidFill>
           <a:schemeClr val="bg1"/>
         </a:solidFill>
         <a:effectLst/>
@@ -36527,6 +38692,35 @@
           </a:p>
         </p:txBody>
       </p:sp>
+      <p:pic>
+        <p:nvPicPr>
+          <p:cNvPr id="3" name="Picture 2">
+            <a:extLst>
+              <a:ext uri="{FF2B5EF4-FFF2-40B4-BE49-F238E27FC236}">
+                <a16:creationId xmlns:a16="http://schemas.microsoft.com/office/drawing/2014/main" id="{AFF1330A-D6D4-FC50-C0CC-B32A097E6036}"/>
+              </a:ext>
+            </a:extLst>
+          </p:cNvPr>
+          <p:cNvPicPr>
+            <a:picLocks noChangeAspect="1"/>
+          </p:cNvPicPr>
+          <p:nvPr/>
+        </p:nvPicPr>
+        <p:blipFill rotWithShape="1">
+          <a:blip r:embed="rId2"/>
+          <a:srcRect l="13756" t="20345" r="1649" b="35983"/>
+          <a:stretch/>
+        </p:blipFill>
+        <p:spPr>
+          <a:xfrm>
+            <a:off x="479950" y="572677"/>
+            <a:ext cx="10313741" cy="2856323"/>
+          </a:xfrm>
+          <a:prstGeom prst="rect">
+            <a:avLst/>
+          </a:prstGeom>
+        </p:spPr>
+      </p:pic>
     </p:spTree>
     <p:extLst>
       <p:ext uri="{BB962C8B-B14F-4D97-AF65-F5344CB8AC3E}">

</xml_diff>

<commit_message>
Improve slide about asymetry
</commit_message>
<xml_diff>
--- a/HexagonalAndBeyond.pptx
+++ b/HexagonalAndBeyond.pptx
@@ -222,7 +222,7 @@
           <a:p>
             <a:fld id="{B9948A3C-6858-443B-89A4-B1C526E3FFA3}" type="datetimeFigureOut">
               <a:rPr lang="en-US" smtClean="0"/>
-              <a:t>06/06/2022</a:t>
+              <a:t>06/07/2022</a:t>
             </a:fld>
             <a:endParaRPr lang="en-US"/>
           </a:p>
@@ -898,7 +898,7 @@
           <a:p>
             <a:fld id="{DC0C38C1-EB25-493B-8E40-CB7D44766240}" type="datetimeFigureOut">
               <a:rPr lang="fr-FR" smtClean="0"/>
-              <a:t>06/06/2022</a:t>
+              <a:t>07/06/2022</a:t>
             </a:fld>
             <a:endParaRPr lang="fr-FR"/>
           </a:p>
@@ -1106,7 +1106,7 @@
           <a:p>
             <a:fld id="{DC0C38C1-EB25-493B-8E40-CB7D44766240}" type="datetimeFigureOut">
               <a:rPr lang="fr-FR" smtClean="0"/>
-              <a:t>06/06/2022</a:t>
+              <a:t>07/06/2022</a:t>
             </a:fld>
             <a:endParaRPr lang="fr-FR"/>
           </a:p>
@@ -1324,7 +1324,7 @@
           <a:p>
             <a:fld id="{DC0C38C1-EB25-493B-8E40-CB7D44766240}" type="datetimeFigureOut">
               <a:rPr lang="fr-FR" smtClean="0"/>
-              <a:t>06/06/2022</a:t>
+              <a:t>07/06/2022</a:t>
             </a:fld>
             <a:endParaRPr lang="fr-FR"/>
           </a:p>
@@ -1532,7 +1532,7 @@
           <a:p>
             <a:fld id="{DC0C38C1-EB25-493B-8E40-CB7D44766240}" type="datetimeFigureOut">
               <a:rPr lang="fr-FR" smtClean="0"/>
-              <a:t>06/06/2022</a:t>
+              <a:t>07/06/2022</a:t>
             </a:fld>
             <a:endParaRPr lang="fr-FR"/>
           </a:p>
@@ -1858,7 +1858,7 @@
           <a:p>
             <a:fld id="{DC0C38C1-EB25-493B-8E40-CB7D44766240}" type="datetimeFigureOut">
               <a:rPr lang="fr-FR" smtClean="0"/>
-              <a:t>06/06/2022</a:t>
+              <a:t>07/06/2022</a:t>
             </a:fld>
             <a:endParaRPr lang="fr-FR"/>
           </a:p>
@@ -2134,7 +2134,7 @@
           <a:p>
             <a:fld id="{DC0C38C1-EB25-493B-8E40-CB7D44766240}" type="datetimeFigureOut">
               <a:rPr lang="fr-FR" smtClean="0"/>
-              <a:t>06/06/2022</a:t>
+              <a:t>07/06/2022</a:t>
             </a:fld>
             <a:endParaRPr lang="fr-FR"/>
           </a:p>
@@ -2557,7 +2557,7 @@
           <a:p>
             <a:fld id="{DC0C38C1-EB25-493B-8E40-CB7D44766240}" type="datetimeFigureOut">
               <a:rPr lang="fr-FR" smtClean="0"/>
-              <a:t>06/06/2022</a:t>
+              <a:t>07/06/2022</a:t>
             </a:fld>
             <a:endParaRPr lang="fr-FR"/>
           </a:p>
@@ -2707,7 +2707,7 @@
           <a:p>
             <a:fld id="{DC0C38C1-EB25-493B-8E40-CB7D44766240}" type="datetimeFigureOut">
               <a:rPr lang="fr-FR" smtClean="0"/>
-              <a:t>06/06/2022</a:t>
+              <a:t>07/06/2022</a:t>
             </a:fld>
             <a:endParaRPr lang="fr-FR"/>
           </a:p>
@@ -2828,7 +2828,7 @@
           <a:p>
             <a:fld id="{DC0C38C1-EB25-493B-8E40-CB7D44766240}" type="datetimeFigureOut">
               <a:rPr lang="fr-FR" smtClean="0"/>
-              <a:t>06/06/2022</a:t>
+              <a:t>07/06/2022</a:t>
             </a:fld>
             <a:endParaRPr lang="fr-FR"/>
           </a:p>
@@ -3149,7 +3149,7 @@
           <a:p>
             <a:fld id="{DC0C38C1-EB25-493B-8E40-CB7D44766240}" type="datetimeFigureOut">
               <a:rPr lang="fr-FR" smtClean="0"/>
-              <a:t>06/06/2022</a:t>
+              <a:t>07/06/2022</a:t>
             </a:fld>
             <a:endParaRPr lang="fr-FR"/>
           </a:p>
@@ -3446,7 +3446,7 @@
           <a:p>
             <a:fld id="{DC0C38C1-EB25-493B-8E40-CB7D44766240}" type="datetimeFigureOut">
               <a:rPr lang="fr-FR" smtClean="0"/>
-              <a:t>06/06/2022</a:t>
+              <a:t>07/06/2022</a:t>
             </a:fld>
             <a:endParaRPr lang="fr-FR"/>
           </a:p>
@@ -3692,7 +3692,7 @@
           <a:p>
             <a:fld id="{DC0C38C1-EB25-493B-8E40-CB7D44766240}" type="datetimeFigureOut">
               <a:rPr lang="fr-FR" smtClean="0"/>
-              <a:t>06/06/2022</a:t>
+              <a:t>07/06/2022</a:t>
             </a:fld>
             <a:endParaRPr lang="fr-FR"/>
           </a:p>
@@ -39179,6 +39179,47 @@
           </a:p>
         </p:txBody>
       </p:sp>
+      <p:sp>
+        <p:nvSpPr>
+          <p:cNvPr id="14" name="TextBox 13">
+            <a:extLst>
+              <a:ext uri="{FF2B5EF4-FFF2-40B4-BE49-F238E27FC236}">
+                <a16:creationId xmlns:a16="http://schemas.microsoft.com/office/drawing/2014/main" id="{A7B76032-0EDE-7371-C9E6-691AD902CF1E}"/>
+              </a:ext>
+            </a:extLst>
+          </p:cNvPr>
+          <p:cNvSpPr txBox="1"/>
+          <p:nvPr/>
+        </p:nvSpPr>
+        <p:spPr>
+          <a:xfrm>
+            <a:off x="4709832" y="1978246"/>
+            <a:ext cx="3048000" cy="461665"/>
+          </a:xfrm>
+          <a:prstGeom prst="rect">
+            <a:avLst/>
+          </a:prstGeom>
+          <a:noFill/>
+        </p:spPr>
+        <p:txBody>
+          <a:bodyPr wrap="square">
+            <a:spAutoFit/>
+          </a:bodyPr>
+          <a:lstStyle/>
+          <a:p>
+            <a:pPr algn="r"/>
+            <a:r>
+              <a:rPr lang="en-GB" sz="2400" b="1" cap="all" dirty="0">
+                <a:solidFill>
+                  <a:srgbClr val="7030A0"/>
+                </a:solidFill>
+                <a:latin typeface="Alte Haas Grotesk" panose="02000503000000020004" pitchFamily="2" charset="0"/>
+              </a:rPr>
+              <a:t>Infra</a:t>
+            </a:r>
+          </a:p>
+        </p:txBody>
+      </p:sp>
     </p:spTree>
     <p:extLst>
       <p:ext uri="{BB962C8B-B14F-4D97-AF65-F5344CB8AC3E}">
@@ -40169,8 +40210,8 @@
           </p:nvCxnSpPr>
           <p:spPr>
             <a:xfrm flipV="1">
-              <a:off x="4175200" y="3022566"/>
-              <a:ext cx="604954" cy="612168"/>
+              <a:off x="4412183" y="3022566"/>
+              <a:ext cx="367971" cy="583337"/>
             </a:xfrm>
             <a:prstGeom prst="bentConnector3">
               <a:avLst/>
@@ -40365,8 +40406,8 @@
           </p:nvSpPr>
           <p:spPr>
             <a:xfrm>
-              <a:off x="3749382" y="3458951"/>
-              <a:ext cx="425818" cy="351565"/>
+              <a:off x="3730598" y="3430120"/>
+              <a:ext cx="681585" cy="351565"/>
             </a:xfrm>
             <a:prstGeom prst="roundRect">
               <a:avLst/>
@@ -40397,11 +40438,18 @@
             </a:fontRef>
           </p:style>
           <p:txBody>
-            <a:bodyPr rtlCol="0" anchor="ctr"/>
+            <a:bodyPr lIns="0" tIns="0" rIns="0" bIns="0" rtlCol="0" anchor="ctr"/>
             <a:lstStyle/>
             <a:p>
               <a:pPr algn="ctr"/>
-              <a:endParaRPr lang="en-GB"/>
+              <a:r>
+                <a:rPr lang="en-GB" sz="700" b="1" dirty="0">
+                  <a:solidFill>
+                    <a:schemeClr val="tx1"/>
+                  </a:solidFill>
+                </a:rPr>
+                <a:t>“implements”</a:t>
+              </a:r>
             </a:p>
           </p:txBody>
         </p:sp>
@@ -40419,7 +40467,7 @@
           </p:nvSpPr>
           <p:spPr>
             <a:xfrm>
-              <a:off x="4178571" y="3547432"/>
+              <a:off x="4421314" y="3519792"/>
               <a:ext cx="167130" cy="167132"/>
             </a:xfrm>
             <a:prstGeom prst="diamond">
@@ -40786,8 +40834,8 @@
           </p:nvCxnSpPr>
           <p:spPr>
             <a:xfrm>
-              <a:off x="3962291" y="3810516"/>
-              <a:ext cx="351409" cy="426765"/>
+              <a:off x="4071391" y="3781685"/>
+              <a:ext cx="242309" cy="455596"/>
             </a:xfrm>
             <a:prstGeom prst="straightConnector1">
               <a:avLst/>
@@ -41051,6 +41099,33 @@
             <a:p>
               <a:pPr algn="ctr"/>
               <a:r>
+                <a:rPr lang="fr-FR" sz="700" b="1" dirty="0">
+                  <a:solidFill>
+                    <a:srgbClr val="C00000"/>
+                  </a:solidFill>
+                </a:rPr>
+                <a:t>« </a:t>
+              </a:r>
+              <a:r>
+                <a:rPr lang="fr-FR" sz="700" b="1" dirty="0" err="1">
+                  <a:solidFill>
+                    <a:srgbClr val="C00000"/>
+                  </a:solidFill>
+                </a:rPr>
+                <a:t>implements</a:t>
+              </a:r>
+              <a:r>
+                <a:rPr lang="fr-FR" sz="700" b="1" dirty="0">
+                  <a:solidFill>
+                    <a:srgbClr val="C00000"/>
+                  </a:solidFill>
+                </a:rPr>
+                <a:t> »</a:t>
+              </a:r>
+            </a:p>
+            <a:p>
+              <a:pPr algn="ctr"/>
+              <a:r>
                 <a:rPr lang="fr-FR" sz="900" cap="all" dirty="0">
                   <a:solidFill>
                     <a:schemeClr val="tx1"/>
@@ -41218,7 +41293,34 @@
             <a:p>
               <a:pPr algn="ctr"/>
               <a:r>
-                <a:rPr lang="fr-FR" sz="900" cap="all" dirty="0">
+                <a:rPr lang="fr-FR" sz="600" b="1" dirty="0">
+                  <a:solidFill>
+                    <a:srgbClr val="C00000"/>
+                  </a:solidFill>
+                </a:rPr>
+                <a:t>« </a:t>
+              </a:r>
+              <a:r>
+                <a:rPr lang="fr-FR" sz="600" b="1" dirty="0" err="1">
+                  <a:solidFill>
+                    <a:srgbClr val="C00000"/>
+                  </a:solidFill>
+                </a:rPr>
+                <a:t>implements</a:t>
+              </a:r>
+              <a:r>
+                <a:rPr lang="fr-FR" sz="600" b="1" dirty="0">
+                  <a:solidFill>
+                    <a:srgbClr val="C00000"/>
+                  </a:solidFill>
+                </a:rPr>
+                <a:t> »</a:t>
+              </a:r>
+            </a:p>
+            <a:p>
+              <a:pPr algn="ctr"/>
+              <a:r>
+                <a:rPr lang="fr-FR" sz="800" cap="all" dirty="0">
                   <a:solidFill>
                     <a:schemeClr val="tx1"/>
                   </a:solidFill>
@@ -41226,7 +41328,7 @@
                 <a:t>Auditorium </a:t>
               </a:r>
               <a:r>
-                <a:rPr lang="fr-FR" sz="900" cap="all" dirty="0" err="1">
+                <a:rPr lang="fr-FR" sz="800" cap="all" dirty="0" err="1">
                   <a:solidFill>
                     <a:schemeClr val="tx1"/>
                   </a:solidFill>
@@ -41234,14 +41336,14 @@
                 <a:t>seating</a:t>
               </a:r>
               <a:r>
-                <a:rPr lang="fr-FR" sz="900" cap="all" dirty="0">
+                <a:rPr lang="fr-FR" sz="800" cap="all" dirty="0">
                   <a:solidFill>
                     <a:schemeClr val="tx1"/>
                   </a:solidFill>
                 </a:rPr>
                 <a:t> web Adapter</a:t>
               </a:r>
-              <a:endParaRPr lang="en-GB" sz="900" cap="all" dirty="0">
+              <a:endParaRPr lang="en-GB" sz="800" cap="all" dirty="0">
                 <a:solidFill>
                   <a:schemeClr val="tx1"/>
                 </a:solidFill>
@@ -41386,7 +41488,7 @@
           </p:nvSpPr>
           <p:spPr>
             <a:xfrm>
-              <a:off x="3492687" y="2670828"/>
+              <a:off x="3445482" y="2724592"/>
               <a:ext cx="618793" cy="215444"/>
             </a:xfrm>
             <a:prstGeom prst="rect">
@@ -41400,6 +41502,7 @@
             </a:bodyPr>
             <a:lstStyle/>
             <a:p>
+              <a:pPr algn="ctr"/>
               <a:r>
                 <a:rPr lang="fr-FR" sz="800" b="1" dirty="0">
                   <a:solidFill>
@@ -41407,7 +41510,7 @@
                   </a:solidFill>
                   <a:latin typeface="Alte Haas Grotesk" panose="02000503000000020004" pitchFamily="2" charset="0"/>
                 </a:rPr>
-                <a:t>(in proc)</a:t>
+                <a:t>« uses »</a:t>
               </a:r>
               <a:endParaRPr lang="en-GB" sz="800" b="1" dirty="0">
                 <a:solidFill>
@@ -41471,10 +41574,10 @@
       </p:sp>
       <p:grpSp>
         <p:nvGrpSpPr>
-          <p:cNvPr id="4" name="Group 3">
+          <p:cNvPr id="24" name="Group 23">
             <a:extLst>
               <a:ext uri="{FF2B5EF4-FFF2-40B4-BE49-F238E27FC236}">
-                <a16:creationId xmlns:a16="http://schemas.microsoft.com/office/drawing/2014/main" id="{27933357-0C22-DF0D-E992-E2FBD5F5AA02}"/>
+                <a16:creationId xmlns:a16="http://schemas.microsoft.com/office/drawing/2014/main" id="{62E348E0-95AA-E1A9-C94B-D5947EAE3A3B}"/>
               </a:ext>
             </a:extLst>
           </p:cNvPr>
@@ -41483,193 +41586,939 @@
         </p:nvGrpSpPr>
         <p:grpSpPr>
           <a:xfrm>
-            <a:off x="1626461" y="1250450"/>
-            <a:ext cx="433987" cy="966307"/>
-            <a:chOff x="1965168" y="2704885"/>
-            <a:chExt cx="171374" cy="381578"/>
+            <a:off x="341511" y="4718933"/>
+            <a:ext cx="2769754" cy="1799360"/>
+            <a:chOff x="341511" y="4718933"/>
+            <a:chExt cx="2769754" cy="1799360"/>
           </a:xfrm>
         </p:grpSpPr>
-        <p:cxnSp>
-          <p:nvCxnSpPr>
-            <p:cNvPr id="55" name="Straight Connector 54">
+        <p:sp>
+          <p:nvSpPr>
+            <p:cNvPr id="75" name="TextBox 74">
               <a:extLst>
                 <a:ext uri="{FF2B5EF4-FFF2-40B4-BE49-F238E27FC236}">
-                  <a16:creationId xmlns:a16="http://schemas.microsoft.com/office/drawing/2014/main" id="{DC68279D-A83E-7324-80B8-5171C272A59B}"/>
+                  <a16:creationId xmlns:a16="http://schemas.microsoft.com/office/drawing/2014/main" id="{65EFF98C-B995-A4F8-EC19-22345C2D0686}"/>
                 </a:ext>
               </a:extLst>
             </p:cNvPr>
-            <p:cNvCxnSpPr>
-              <a:cxnSpLocks/>
-            </p:cNvCxnSpPr>
-            <p:nvPr/>
-          </p:nvCxnSpPr>
-          <p:spPr>
-            <a:xfrm>
-              <a:off x="2050855" y="2876259"/>
-              <a:ext cx="0" cy="210204"/>
-            </a:xfrm>
-            <a:prstGeom prst="line">
-              <a:avLst/>
-            </a:prstGeom>
-            <a:ln w="79375">
-              <a:solidFill>
-                <a:schemeClr val="tx1"/>
-              </a:solidFill>
-            </a:ln>
-          </p:spPr>
-          <p:style>
-            <a:lnRef idx="1">
-              <a:schemeClr val="accent1"/>
-            </a:lnRef>
-            <a:fillRef idx="0">
-              <a:schemeClr val="accent1"/>
-            </a:fillRef>
-            <a:effectRef idx="0">
-              <a:schemeClr val="accent1"/>
-            </a:effectRef>
-            <a:fontRef idx="minor">
-              <a:schemeClr val="tx1"/>
-            </a:fontRef>
-          </p:style>
-        </p:cxnSp>
-        <p:sp>
-          <p:nvSpPr>
-            <p:cNvPr id="56" name="Oval 55">
-              <a:extLst>
-                <a:ext uri="{FF2B5EF4-FFF2-40B4-BE49-F238E27FC236}">
-                  <a16:creationId xmlns:a16="http://schemas.microsoft.com/office/drawing/2014/main" id="{4C70A84D-D904-96E4-3C82-748B751FF6FE}"/>
-                </a:ext>
-              </a:extLst>
-            </p:cNvPr>
-            <p:cNvSpPr/>
+            <p:cNvSpPr txBox="1"/>
             <p:nvPr/>
           </p:nvSpPr>
           <p:spPr>
             <a:xfrm>
-              <a:off x="1965168" y="2704885"/>
-              <a:ext cx="171374" cy="171374"/>
+              <a:off x="381094" y="4718933"/>
+              <a:ext cx="2690589" cy="1799360"/>
             </a:xfrm>
-            <a:prstGeom prst="ellipse">
+            <a:prstGeom prst="rect">
               <a:avLst/>
             </a:prstGeom>
             <a:solidFill>
-              <a:schemeClr val="bg1"/>
+              <a:schemeClr val="bg1">
+                <a:alpha val="50000"/>
+              </a:schemeClr>
             </a:solidFill>
-            <a:ln w="79375">
-              <a:solidFill>
-                <a:schemeClr val="tx1"/>
-              </a:solidFill>
-            </a:ln>
           </p:spPr>
-          <p:style>
-            <a:lnRef idx="2">
-              <a:schemeClr val="accent1">
-                <a:shade val="50000"/>
-              </a:schemeClr>
-            </a:lnRef>
-            <a:fillRef idx="1">
-              <a:schemeClr val="accent1"/>
-            </a:fillRef>
-            <a:effectRef idx="0">
-              <a:schemeClr val="accent1"/>
-            </a:effectRef>
-            <a:fontRef idx="minor">
-              <a:schemeClr val="lt1"/>
-            </a:fontRef>
-          </p:style>
           <p:txBody>
-            <a:bodyPr rtlCol="0" anchor="ctr"/>
+            <a:bodyPr wrap="square" rtlCol="0">
+              <a:noAutofit/>
+            </a:bodyPr>
             <a:lstStyle/>
             <a:p>
-              <a:pPr algn="ctr"/>
-              <a:endParaRPr lang="en-GB" sz="2000"/>
+              <a:endParaRPr lang="en-US" sz="1400" i="1" dirty="0">
+                <a:solidFill>
+                  <a:schemeClr val="bg1"/>
+                </a:solidFill>
+              </a:endParaRPr>
             </a:p>
           </p:txBody>
         </p:sp>
+        <p:grpSp>
+          <p:nvGrpSpPr>
+            <p:cNvPr id="16" name="Group 15">
+              <a:extLst>
+                <a:ext uri="{FF2B5EF4-FFF2-40B4-BE49-F238E27FC236}">
+                  <a16:creationId xmlns:a16="http://schemas.microsoft.com/office/drawing/2014/main" id="{4B9745AB-5849-07E2-B15A-F51F3F5DF45A}"/>
+                </a:ext>
+              </a:extLst>
+            </p:cNvPr>
+            <p:cNvGrpSpPr/>
+            <p:nvPr/>
+          </p:nvGrpSpPr>
+          <p:grpSpPr>
+            <a:xfrm>
+              <a:off x="341511" y="4946449"/>
+              <a:ext cx="2769754" cy="1417786"/>
+              <a:chOff x="341511" y="4946449"/>
+              <a:chExt cx="2769754" cy="1417786"/>
+            </a:xfrm>
+          </p:grpSpPr>
+          <p:grpSp>
+            <p:nvGrpSpPr>
+              <p:cNvPr id="4" name="Group 3">
+                <a:extLst>
+                  <a:ext uri="{FF2B5EF4-FFF2-40B4-BE49-F238E27FC236}">
+                    <a16:creationId xmlns:a16="http://schemas.microsoft.com/office/drawing/2014/main" id="{27933357-0C22-DF0D-E992-E2FBD5F5AA02}"/>
+                  </a:ext>
+                </a:extLst>
+              </p:cNvPr>
+              <p:cNvGrpSpPr/>
+              <p:nvPr/>
+            </p:nvGrpSpPr>
+            <p:grpSpPr>
+              <a:xfrm>
+                <a:off x="1509395" y="4946449"/>
+                <a:ext cx="333215" cy="741930"/>
+                <a:chOff x="1965168" y="2704885"/>
+                <a:chExt cx="171374" cy="381578"/>
+              </a:xfrm>
+            </p:grpSpPr>
+            <p:cxnSp>
+              <p:nvCxnSpPr>
+                <p:cNvPr id="55" name="Straight Connector 54">
+                  <a:extLst>
+                    <a:ext uri="{FF2B5EF4-FFF2-40B4-BE49-F238E27FC236}">
+                      <a16:creationId xmlns:a16="http://schemas.microsoft.com/office/drawing/2014/main" id="{DC68279D-A83E-7324-80B8-5171C272A59B}"/>
+                    </a:ext>
+                  </a:extLst>
+                </p:cNvPr>
+                <p:cNvCxnSpPr>
+                  <a:cxnSpLocks/>
+                </p:cNvCxnSpPr>
+                <p:nvPr/>
+              </p:nvCxnSpPr>
+              <p:spPr>
+                <a:xfrm>
+                  <a:off x="2050855" y="2876259"/>
+                  <a:ext cx="0" cy="210204"/>
+                </a:xfrm>
+                <a:prstGeom prst="line">
+                  <a:avLst/>
+                </a:prstGeom>
+                <a:ln w="79375">
+                  <a:solidFill>
+                    <a:schemeClr val="tx1"/>
+                  </a:solidFill>
+                </a:ln>
+              </p:spPr>
+              <p:style>
+                <a:lnRef idx="1">
+                  <a:schemeClr val="accent1"/>
+                </a:lnRef>
+                <a:fillRef idx="0">
+                  <a:schemeClr val="accent1"/>
+                </a:fillRef>
+                <a:effectRef idx="0">
+                  <a:schemeClr val="accent1"/>
+                </a:effectRef>
+                <a:fontRef idx="minor">
+                  <a:schemeClr val="tx1"/>
+                </a:fontRef>
+              </p:style>
+            </p:cxnSp>
+            <p:sp>
+              <p:nvSpPr>
+                <p:cNvPr id="56" name="Oval 55">
+                  <a:extLst>
+                    <a:ext uri="{FF2B5EF4-FFF2-40B4-BE49-F238E27FC236}">
+                      <a16:creationId xmlns:a16="http://schemas.microsoft.com/office/drawing/2014/main" id="{4C70A84D-D904-96E4-3C82-748B751FF6FE}"/>
+                    </a:ext>
+                  </a:extLst>
+                </p:cNvPr>
+                <p:cNvSpPr/>
+                <p:nvPr/>
+              </p:nvSpPr>
+              <p:spPr>
+                <a:xfrm>
+                  <a:off x="1965168" y="2704885"/>
+                  <a:ext cx="171374" cy="171374"/>
+                </a:xfrm>
+                <a:prstGeom prst="ellipse">
+                  <a:avLst/>
+                </a:prstGeom>
+                <a:solidFill>
+                  <a:schemeClr val="bg1"/>
+                </a:solidFill>
+                <a:ln w="79375">
+                  <a:solidFill>
+                    <a:schemeClr val="tx1"/>
+                  </a:solidFill>
+                </a:ln>
+              </p:spPr>
+              <p:style>
+                <a:lnRef idx="2">
+                  <a:schemeClr val="accent1">
+                    <a:shade val="50000"/>
+                  </a:schemeClr>
+                </a:lnRef>
+                <a:fillRef idx="1">
+                  <a:schemeClr val="accent1"/>
+                </a:fillRef>
+                <a:effectRef idx="0">
+                  <a:schemeClr val="accent1"/>
+                </a:effectRef>
+                <a:fontRef idx="minor">
+                  <a:schemeClr val="lt1"/>
+                </a:fontRef>
+              </p:style>
+              <p:txBody>
+                <a:bodyPr rtlCol="0" anchor="ctr"/>
+                <a:lstStyle/>
+                <a:p>
+                  <a:pPr algn="ctr"/>
+                  <a:endParaRPr lang="en-GB" sz="1600"/>
+                </a:p>
+              </p:txBody>
+            </p:sp>
+          </p:grpSp>
+          <p:sp>
+            <p:nvSpPr>
+              <p:cNvPr id="58" name="TextBox 57">
+                <a:extLst>
+                  <a:ext uri="{FF2B5EF4-FFF2-40B4-BE49-F238E27FC236}">
+                    <a16:creationId xmlns:a16="http://schemas.microsoft.com/office/drawing/2014/main" id="{C4310008-1AAB-20E4-D325-4A13492AF26D}"/>
+                  </a:ext>
+                </a:extLst>
+              </p:cNvPr>
+              <p:cNvSpPr txBox="1"/>
+              <p:nvPr/>
+            </p:nvSpPr>
+            <p:spPr>
+              <a:xfrm>
+                <a:off x="341511" y="5779460"/>
+                <a:ext cx="2769754" cy="584775"/>
+              </a:xfrm>
+              <a:prstGeom prst="rect">
+                <a:avLst/>
+              </a:prstGeom>
+              <a:noFill/>
+            </p:spPr>
+            <p:txBody>
+              <a:bodyPr wrap="square" rtlCol="0" anchor="ctr">
+                <a:spAutoFit/>
+              </a:bodyPr>
+              <a:lstStyle/>
+              <a:p>
+                <a:pPr algn="ctr"/>
+                <a:r>
+                  <a:rPr lang="en-US" sz="1600" b="1" cap="all" dirty="0">
+                    <a:latin typeface="Alte Haas Grotesk" panose="02000503000000020004" pitchFamily="2" charset="0"/>
+                  </a:rPr>
+                  <a:t>Left-side Ports</a:t>
+                </a:r>
+              </a:p>
+              <a:p>
+                <a:pPr algn="ctr"/>
+                <a:r>
+                  <a:rPr lang="en-US" sz="1600" b="1" cap="all" dirty="0">
+                    <a:solidFill>
+                      <a:srgbClr val="C00000"/>
+                    </a:solidFill>
+                    <a:latin typeface="Alte Haas Grotesk" panose="02000503000000020004" pitchFamily="2" charset="0"/>
+                  </a:rPr>
+                  <a:t>to enter our DOMAIN</a:t>
+                </a:r>
+              </a:p>
+            </p:txBody>
+          </p:sp>
+        </p:grpSp>
+      </p:grpSp>
+      <p:grpSp>
+        <p:nvGrpSpPr>
+          <p:cNvPr id="25" name="Group 24">
+            <a:extLst>
+              <a:ext uri="{FF2B5EF4-FFF2-40B4-BE49-F238E27FC236}">
+                <a16:creationId xmlns:a16="http://schemas.microsoft.com/office/drawing/2014/main" id="{D84129EB-2D9E-2D59-8B3C-7877A3E96595}"/>
+              </a:ext>
+            </a:extLst>
+          </p:cNvPr>
+          <p:cNvGrpSpPr/>
+          <p:nvPr/>
+        </p:nvGrpSpPr>
+        <p:grpSpPr>
+          <a:xfrm>
+            <a:off x="304414" y="416984"/>
+            <a:ext cx="2769754" cy="2745836"/>
+            <a:chOff x="304414" y="416984"/>
+            <a:chExt cx="2769754" cy="2745836"/>
+          </a:xfrm>
+        </p:grpSpPr>
+        <p:sp>
+          <p:nvSpPr>
+            <p:cNvPr id="73" name="TextBox 72">
+              <a:extLst>
+                <a:ext uri="{FF2B5EF4-FFF2-40B4-BE49-F238E27FC236}">
+                  <a16:creationId xmlns:a16="http://schemas.microsoft.com/office/drawing/2014/main" id="{DEE8EE4E-2167-8FEA-B736-ECB334203ED8}"/>
+                </a:ext>
+              </a:extLst>
+            </p:cNvPr>
+            <p:cNvSpPr txBox="1"/>
+            <p:nvPr/>
+          </p:nvSpPr>
+          <p:spPr>
+            <a:xfrm>
+              <a:off x="343997" y="416984"/>
+              <a:ext cx="2690589" cy="2745836"/>
+            </a:xfrm>
+            <a:prstGeom prst="rect">
+              <a:avLst/>
+            </a:prstGeom>
+            <a:solidFill>
+              <a:schemeClr val="bg1">
+                <a:alpha val="50000"/>
+              </a:schemeClr>
+            </a:solidFill>
+          </p:spPr>
+          <p:txBody>
+            <a:bodyPr wrap="square" rtlCol="0">
+              <a:noAutofit/>
+            </a:bodyPr>
+            <a:lstStyle/>
+            <a:p>
+              <a:endParaRPr lang="en-US" sz="1400" i="1" dirty="0">
+                <a:solidFill>
+                  <a:schemeClr val="bg1"/>
+                </a:solidFill>
+              </a:endParaRPr>
+            </a:p>
+          </p:txBody>
+        </p:sp>
+        <p:grpSp>
+          <p:nvGrpSpPr>
+            <p:cNvPr id="17" name="Group 16">
+              <a:extLst>
+                <a:ext uri="{FF2B5EF4-FFF2-40B4-BE49-F238E27FC236}">
+                  <a16:creationId xmlns:a16="http://schemas.microsoft.com/office/drawing/2014/main" id="{52A41478-3A7C-25B0-31B8-562CCD477DA1}"/>
+                </a:ext>
+              </a:extLst>
+            </p:cNvPr>
+            <p:cNvGrpSpPr/>
+            <p:nvPr/>
+          </p:nvGrpSpPr>
+          <p:grpSpPr>
+            <a:xfrm>
+              <a:off x="304414" y="774903"/>
+              <a:ext cx="2769754" cy="2166476"/>
+              <a:chOff x="304414" y="1238199"/>
+              <a:chExt cx="2769754" cy="2166476"/>
+            </a:xfrm>
+          </p:grpSpPr>
+          <p:sp>
+            <p:nvSpPr>
+              <p:cNvPr id="41" name="Rectangle 40">
+                <a:extLst>
+                  <a:ext uri="{FF2B5EF4-FFF2-40B4-BE49-F238E27FC236}">
+                    <a16:creationId xmlns:a16="http://schemas.microsoft.com/office/drawing/2014/main" id="{66E8D063-97D3-B05D-E4FD-111BEFA4586E}"/>
+                  </a:ext>
+                </a:extLst>
+              </p:cNvPr>
+              <p:cNvSpPr/>
+              <p:nvPr/>
+            </p:nvSpPr>
+            <p:spPr>
+              <a:xfrm rot="17820000">
+                <a:off x="1113666" y="1432387"/>
+                <a:ext cx="1151250" cy="762873"/>
+              </a:xfrm>
+              <a:prstGeom prst="rect">
+                <a:avLst/>
+              </a:prstGeom>
+              <a:solidFill>
+                <a:schemeClr val="accent6">
+                  <a:lumMod val="20000"/>
+                  <a:lumOff val="80000"/>
+                </a:schemeClr>
+              </a:solidFill>
+              <a:ln w="60325">
+                <a:solidFill>
+                  <a:schemeClr val="tx1"/>
+                </a:solidFill>
+              </a:ln>
+            </p:spPr>
+            <p:style>
+              <a:lnRef idx="2">
+                <a:schemeClr val="accent1">
+                  <a:shade val="50000"/>
+                </a:schemeClr>
+              </a:lnRef>
+              <a:fillRef idx="1">
+                <a:schemeClr val="accent1"/>
+              </a:fillRef>
+              <a:effectRef idx="0">
+                <a:schemeClr val="accent1"/>
+              </a:effectRef>
+              <a:fontRef idx="minor">
+                <a:schemeClr val="lt1"/>
+              </a:fontRef>
+            </p:style>
+            <p:txBody>
+              <a:bodyPr rtlCol="0" anchor="ctr"/>
+              <a:lstStyle/>
+              <a:p>
+                <a:pPr algn="ctr"/>
+                <a:r>
+                  <a:rPr lang="fr-FR" sz="1400" b="1" cap="all" dirty="0" err="1">
+                    <a:solidFill>
+                      <a:schemeClr val="tx1"/>
+                    </a:solidFill>
+                    <a:latin typeface="Alte Haas Grotesk" panose="02000503000000020004" pitchFamily="2" charset="0"/>
+                  </a:rPr>
+                  <a:t>Left</a:t>
+                </a:r>
+                <a:r>
+                  <a:rPr lang="fr-FR" sz="1400" b="1" cap="all" dirty="0">
+                    <a:solidFill>
+                      <a:schemeClr val="tx1"/>
+                    </a:solidFill>
+                    <a:latin typeface="Alte Haas Grotesk" panose="02000503000000020004" pitchFamily="2" charset="0"/>
+                  </a:rPr>
+                  <a:t> </a:t>
+                </a:r>
+                <a:r>
+                  <a:rPr lang="fr-FR" sz="1400" b="1" cap="all" dirty="0" err="1">
+                    <a:solidFill>
+                      <a:schemeClr val="tx1"/>
+                    </a:solidFill>
+                    <a:latin typeface="Alte Haas Grotesk" panose="02000503000000020004" pitchFamily="2" charset="0"/>
+                  </a:rPr>
+                  <a:t>adapters</a:t>
+                </a:r>
+                <a:endParaRPr lang="en-GB" sz="1400" b="1" cap="all" dirty="0">
+                  <a:solidFill>
+                    <a:schemeClr val="tx1"/>
+                  </a:solidFill>
+                  <a:latin typeface="Alte Haas Grotesk" panose="02000503000000020004" pitchFamily="2" charset="0"/>
+                </a:endParaRPr>
+              </a:p>
+            </p:txBody>
+          </p:sp>
+          <p:sp>
+            <p:nvSpPr>
+              <p:cNvPr id="42" name="TextBox 41">
+                <a:extLst>
+                  <a:ext uri="{FF2B5EF4-FFF2-40B4-BE49-F238E27FC236}">
+                    <a16:creationId xmlns:a16="http://schemas.microsoft.com/office/drawing/2014/main" id="{44A9F5C7-8234-E48F-1C51-ED05DD5983F4}"/>
+                  </a:ext>
+                </a:extLst>
+              </p:cNvPr>
+              <p:cNvSpPr txBox="1"/>
+              <p:nvPr/>
+            </p:nvSpPr>
+            <p:spPr>
+              <a:xfrm>
+                <a:off x="304414" y="2573678"/>
+                <a:ext cx="2769754" cy="830997"/>
+              </a:xfrm>
+              <a:prstGeom prst="rect">
+                <a:avLst/>
+              </a:prstGeom>
+              <a:noFill/>
+            </p:spPr>
+            <p:txBody>
+              <a:bodyPr wrap="square" rtlCol="0" anchor="ctr">
+                <a:spAutoFit/>
+              </a:bodyPr>
+              <a:lstStyle/>
+              <a:p>
+                <a:pPr algn="ctr"/>
+                <a:r>
+                  <a:rPr lang="en-US" sz="1600" b="1" cap="all" dirty="0">
+                    <a:latin typeface="Alte Haas Grotesk" panose="02000503000000020004" pitchFamily="2" charset="0"/>
+                  </a:rPr>
+                  <a:t>Left-side adapters translate </a:t>
+                </a:r>
+                <a:br>
+                  <a:rPr lang="en-US" sz="1600" b="1" cap="all" dirty="0">
+                    <a:latin typeface="Alte Haas Grotesk" panose="02000503000000020004" pitchFamily="2" charset="0"/>
+                  </a:rPr>
+                </a:br>
+                <a:r>
+                  <a:rPr lang="en-US" sz="1600" b="1" cap="all" dirty="0">
+                    <a:solidFill>
+                      <a:srgbClr val="C00000"/>
+                    </a:solidFill>
+                    <a:latin typeface="Alte Haas Grotesk" panose="02000503000000020004" pitchFamily="2" charset="0"/>
+                  </a:rPr>
+                  <a:t>tech to domain</a:t>
+                </a:r>
+              </a:p>
+            </p:txBody>
+          </p:sp>
+        </p:grpSp>
+      </p:grpSp>
+      <p:grpSp>
+        <p:nvGrpSpPr>
+          <p:cNvPr id="23" name="Group 22">
+            <a:extLst>
+              <a:ext uri="{FF2B5EF4-FFF2-40B4-BE49-F238E27FC236}">
+                <a16:creationId xmlns:a16="http://schemas.microsoft.com/office/drawing/2014/main" id="{3EFCCBE1-0A58-4728-74B2-4610C962A733}"/>
+              </a:ext>
+            </a:extLst>
+          </p:cNvPr>
+          <p:cNvGrpSpPr/>
+          <p:nvPr/>
+        </p:nvGrpSpPr>
+        <p:grpSpPr>
+          <a:xfrm>
+            <a:off x="9016962" y="4183418"/>
+            <a:ext cx="2769754" cy="2456795"/>
+            <a:chOff x="9045156" y="4183418"/>
+            <a:chExt cx="2769754" cy="2456795"/>
+          </a:xfrm>
+        </p:grpSpPr>
+        <p:sp>
+          <p:nvSpPr>
+            <p:cNvPr id="74" name="TextBox 73">
+              <a:extLst>
+                <a:ext uri="{FF2B5EF4-FFF2-40B4-BE49-F238E27FC236}">
+                  <a16:creationId xmlns:a16="http://schemas.microsoft.com/office/drawing/2014/main" id="{79837848-59D8-6F12-02F5-37547A7D5F7B}"/>
+                </a:ext>
+              </a:extLst>
+            </p:cNvPr>
+            <p:cNvSpPr txBox="1"/>
+            <p:nvPr/>
+          </p:nvSpPr>
+          <p:spPr>
+            <a:xfrm>
+              <a:off x="9084739" y="4183418"/>
+              <a:ext cx="2690589" cy="2456795"/>
+            </a:xfrm>
+            <a:prstGeom prst="rect">
+              <a:avLst/>
+            </a:prstGeom>
+            <a:solidFill>
+              <a:schemeClr val="bg1">
+                <a:alpha val="50000"/>
+              </a:schemeClr>
+            </a:solidFill>
+          </p:spPr>
+          <p:txBody>
+            <a:bodyPr wrap="square" rtlCol="0">
+              <a:noAutofit/>
+            </a:bodyPr>
+            <a:lstStyle/>
+            <a:p>
+              <a:endParaRPr lang="en-US" sz="1400" i="1" dirty="0">
+                <a:solidFill>
+                  <a:schemeClr val="bg1"/>
+                </a:solidFill>
+              </a:endParaRPr>
+            </a:p>
+          </p:txBody>
+        </p:sp>
+        <p:grpSp>
+          <p:nvGrpSpPr>
+            <p:cNvPr id="14" name="Group 13">
+              <a:extLst>
+                <a:ext uri="{FF2B5EF4-FFF2-40B4-BE49-F238E27FC236}">
+                  <a16:creationId xmlns:a16="http://schemas.microsoft.com/office/drawing/2014/main" id="{C0ECF4CF-B901-C335-1C18-F83FDB77A7C8}"/>
+                </a:ext>
+              </a:extLst>
+            </p:cNvPr>
+            <p:cNvGrpSpPr/>
+            <p:nvPr/>
+          </p:nvGrpSpPr>
+          <p:grpSpPr>
+            <a:xfrm>
+              <a:off x="9045156" y="4377946"/>
+              <a:ext cx="2769754" cy="2140347"/>
+              <a:chOff x="9035854" y="4377946"/>
+              <a:chExt cx="2769754" cy="2140347"/>
+            </a:xfrm>
+          </p:grpSpPr>
+          <p:sp>
+            <p:nvSpPr>
+              <p:cNvPr id="57" name="Rectangle 56">
+                <a:extLst>
+                  <a:ext uri="{FF2B5EF4-FFF2-40B4-BE49-F238E27FC236}">
+                    <a16:creationId xmlns:a16="http://schemas.microsoft.com/office/drawing/2014/main" id="{A3349801-769A-872D-3FC1-1A90440DBCB8}"/>
+                  </a:ext>
+                </a:extLst>
+              </p:cNvPr>
+              <p:cNvSpPr/>
+              <p:nvPr/>
+            </p:nvSpPr>
+            <p:spPr>
+              <a:xfrm rot="17820000">
+                <a:off x="9845106" y="4572134"/>
+                <a:ext cx="1151250" cy="762873"/>
+              </a:xfrm>
+              <a:prstGeom prst="rect">
+                <a:avLst/>
+              </a:prstGeom>
+              <a:solidFill>
+                <a:srgbClr val="FFD966"/>
+              </a:solidFill>
+              <a:ln w="60325">
+                <a:solidFill>
+                  <a:schemeClr val="tx1"/>
+                </a:solidFill>
+              </a:ln>
+            </p:spPr>
+            <p:style>
+              <a:lnRef idx="2">
+                <a:schemeClr val="accent1">
+                  <a:shade val="50000"/>
+                </a:schemeClr>
+              </a:lnRef>
+              <a:fillRef idx="1">
+                <a:schemeClr val="accent1"/>
+              </a:fillRef>
+              <a:effectRef idx="0">
+                <a:schemeClr val="accent1"/>
+              </a:effectRef>
+              <a:fontRef idx="minor">
+                <a:schemeClr val="lt1"/>
+              </a:fontRef>
+            </p:style>
+            <p:txBody>
+              <a:bodyPr rtlCol="0" anchor="ctr"/>
+              <a:lstStyle/>
+              <a:p>
+                <a:pPr algn="ctr"/>
+                <a:r>
+                  <a:rPr lang="fr-FR" sz="1400" b="1" cap="all" dirty="0">
+                    <a:solidFill>
+                      <a:schemeClr val="tx1"/>
+                    </a:solidFill>
+                    <a:latin typeface="Alte Haas Grotesk" panose="02000503000000020004" pitchFamily="2" charset="0"/>
+                  </a:rPr>
+                  <a:t>Right </a:t>
+                </a:r>
+                <a:r>
+                  <a:rPr lang="fr-FR" sz="1400" b="1" cap="all" dirty="0" err="1">
+                    <a:solidFill>
+                      <a:schemeClr val="tx1"/>
+                    </a:solidFill>
+                    <a:latin typeface="Alte Haas Grotesk" panose="02000503000000020004" pitchFamily="2" charset="0"/>
+                  </a:rPr>
+                  <a:t>Adapters</a:t>
+                </a:r>
+                <a:endParaRPr lang="en-GB" sz="1400" b="1" cap="all" dirty="0">
+                  <a:solidFill>
+                    <a:schemeClr val="tx1"/>
+                  </a:solidFill>
+                  <a:latin typeface="Alte Haas Grotesk" panose="02000503000000020004" pitchFamily="2" charset="0"/>
+                </a:endParaRPr>
+              </a:p>
+            </p:txBody>
+          </p:sp>
+          <p:sp>
+            <p:nvSpPr>
+              <p:cNvPr id="54" name="TextBox 53">
+                <a:extLst>
+                  <a:ext uri="{FF2B5EF4-FFF2-40B4-BE49-F238E27FC236}">
+                    <a16:creationId xmlns:a16="http://schemas.microsoft.com/office/drawing/2014/main" id="{F04CF76F-E99B-A719-220D-20B97B210456}"/>
+                  </a:ext>
+                </a:extLst>
+              </p:cNvPr>
+              <p:cNvSpPr txBox="1"/>
+              <p:nvPr/>
+            </p:nvSpPr>
+            <p:spPr>
+              <a:xfrm>
+                <a:off x="9035854" y="5687296"/>
+                <a:ext cx="2769754" cy="830997"/>
+              </a:xfrm>
+              <a:prstGeom prst="rect">
+                <a:avLst/>
+              </a:prstGeom>
+              <a:noFill/>
+            </p:spPr>
+            <p:txBody>
+              <a:bodyPr wrap="square" rtlCol="0" anchor="ctr">
+                <a:spAutoFit/>
+              </a:bodyPr>
+              <a:lstStyle/>
+              <a:p>
+                <a:pPr algn="ctr"/>
+                <a:r>
+                  <a:rPr lang="en-US" sz="1600" b="1" cap="all" dirty="0">
+                    <a:latin typeface="Alte Haas Grotesk" panose="02000503000000020004" pitchFamily="2" charset="0"/>
+                  </a:rPr>
+                  <a:t>Right-side adapters translate </a:t>
+                </a:r>
+                <a:r>
+                  <a:rPr lang="en-US" sz="1600" b="1" cap="all" dirty="0">
+                    <a:solidFill>
+                      <a:srgbClr val="C00000"/>
+                    </a:solidFill>
+                    <a:latin typeface="Alte Haas Grotesk" panose="02000503000000020004" pitchFamily="2" charset="0"/>
+                  </a:rPr>
+                  <a:t>domain to tech</a:t>
+                </a:r>
+              </a:p>
+            </p:txBody>
+          </p:sp>
+        </p:grpSp>
+      </p:grpSp>
+      <p:grpSp>
+        <p:nvGrpSpPr>
+          <p:cNvPr id="22" name="Group 21">
+            <a:extLst>
+              <a:ext uri="{FF2B5EF4-FFF2-40B4-BE49-F238E27FC236}">
+                <a16:creationId xmlns:a16="http://schemas.microsoft.com/office/drawing/2014/main" id="{57EC4C1B-655D-DF0E-A39B-A447D289ED0F}"/>
+              </a:ext>
+            </a:extLst>
+          </p:cNvPr>
+          <p:cNvGrpSpPr/>
+          <p:nvPr/>
+        </p:nvGrpSpPr>
+        <p:grpSpPr>
+          <a:xfrm>
+            <a:off x="9016962" y="1013903"/>
+            <a:ext cx="2769754" cy="1799360"/>
+            <a:chOff x="8988769" y="1013903"/>
+            <a:chExt cx="2769754" cy="1799360"/>
+          </a:xfrm>
+        </p:grpSpPr>
+        <p:sp>
+          <p:nvSpPr>
+            <p:cNvPr id="76" name="TextBox 75">
+              <a:extLst>
+                <a:ext uri="{FF2B5EF4-FFF2-40B4-BE49-F238E27FC236}">
+                  <a16:creationId xmlns:a16="http://schemas.microsoft.com/office/drawing/2014/main" id="{BFE85372-F9CA-C2EC-8A0A-D54CD9E9BFB3}"/>
+                </a:ext>
+              </a:extLst>
+            </p:cNvPr>
+            <p:cNvSpPr txBox="1"/>
+            <p:nvPr/>
+          </p:nvSpPr>
+          <p:spPr>
+            <a:xfrm>
+              <a:off x="9028352" y="1013903"/>
+              <a:ext cx="2690589" cy="1799360"/>
+            </a:xfrm>
+            <a:prstGeom prst="rect">
+              <a:avLst/>
+            </a:prstGeom>
+            <a:solidFill>
+              <a:schemeClr val="bg1">
+                <a:alpha val="50000"/>
+              </a:schemeClr>
+            </a:solidFill>
+          </p:spPr>
+          <p:txBody>
+            <a:bodyPr wrap="square" rtlCol="0">
+              <a:noAutofit/>
+            </a:bodyPr>
+            <a:lstStyle/>
+            <a:p>
+              <a:endParaRPr lang="en-US" sz="1400" i="1" dirty="0">
+                <a:solidFill>
+                  <a:schemeClr val="bg1"/>
+                </a:solidFill>
+              </a:endParaRPr>
+            </a:p>
+          </p:txBody>
+        </p:sp>
+        <p:grpSp>
+          <p:nvGrpSpPr>
+            <p:cNvPr id="15" name="Group 14">
+              <a:extLst>
+                <a:ext uri="{FF2B5EF4-FFF2-40B4-BE49-F238E27FC236}">
+                  <a16:creationId xmlns:a16="http://schemas.microsoft.com/office/drawing/2014/main" id="{94F2F14C-C3B3-E3FD-4B62-FF21B7638D8E}"/>
+                </a:ext>
+              </a:extLst>
+            </p:cNvPr>
+            <p:cNvGrpSpPr/>
+            <p:nvPr/>
+          </p:nvGrpSpPr>
+          <p:grpSpPr>
+            <a:xfrm>
+              <a:off x="8988769" y="1350091"/>
+              <a:ext cx="2769754" cy="1314501"/>
+              <a:chOff x="8988769" y="1350091"/>
+              <a:chExt cx="2769754" cy="1314501"/>
+            </a:xfrm>
+          </p:grpSpPr>
+          <p:grpSp>
+            <p:nvGrpSpPr>
+              <p:cNvPr id="60" name="Group 59">
+                <a:extLst>
+                  <a:ext uri="{FF2B5EF4-FFF2-40B4-BE49-F238E27FC236}">
+                    <a16:creationId xmlns:a16="http://schemas.microsoft.com/office/drawing/2014/main" id="{69569D49-812D-A592-10BD-E479797A7894}"/>
+                  </a:ext>
+                </a:extLst>
+              </p:cNvPr>
+              <p:cNvGrpSpPr/>
+              <p:nvPr/>
+            </p:nvGrpSpPr>
+            <p:grpSpPr>
+              <a:xfrm rot="17647871">
+                <a:off x="10084056" y="1145734"/>
+                <a:ext cx="333215" cy="741930"/>
+                <a:chOff x="1965168" y="2704885"/>
+                <a:chExt cx="171374" cy="381578"/>
+              </a:xfrm>
+            </p:grpSpPr>
+            <p:cxnSp>
+              <p:nvCxnSpPr>
+                <p:cNvPr id="61" name="Straight Connector 60">
+                  <a:extLst>
+                    <a:ext uri="{FF2B5EF4-FFF2-40B4-BE49-F238E27FC236}">
+                      <a16:creationId xmlns:a16="http://schemas.microsoft.com/office/drawing/2014/main" id="{7C2BEF41-370A-867C-AE12-3963289987CF}"/>
+                    </a:ext>
+                  </a:extLst>
+                </p:cNvPr>
+                <p:cNvCxnSpPr>
+                  <a:cxnSpLocks/>
+                </p:cNvCxnSpPr>
+                <p:nvPr/>
+              </p:nvCxnSpPr>
+              <p:spPr>
+                <a:xfrm>
+                  <a:off x="2050855" y="2876259"/>
+                  <a:ext cx="0" cy="210204"/>
+                </a:xfrm>
+                <a:prstGeom prst="line">
+                  <a:avLst/>
+                </a:prstGeom>
+                <a:ln w="79375">
+                  <a:solidFill>
+                    <a:schemeClr val="tx1"/>
+                  </a:solidFill>
+                </a:ln>
+              </p:spPr>
+              <p:style>
+                <a:lnRef idx="1">
+                  <a:schemeClr val="accent1"/>
+                </a:lnRef>
+                <a:fillRef idx="0">
+                  <a:schemeClr val="accent1"/>
+                </a:fillRef>
+                <a:effectRef idx="0">
+                  <a:schemeClr val="accent1"/>
+                </a:effectRef>
+                <a:fontRef idx="minor">
+                  <a:schemeClr val="tx1"/>
+                </a:fontRef>
+              </p:style>
+            </p:cxnSp>
+            <p:sp>
+              <p:nvSpPr>
+                <p:cNvPr id="62" name="Oval 61">
+                  <a:extLst>
+                    <a:ext uri="{FF2B5EF4-FFF2-40B4-BE49-F238E27FC236}">
+                      <a16:creationId xmlns:a16="http://schemas.microsoft.com/office/drawing/2014/main" id="{B947F06E-0722-4212-8690-62494898A77C}"/>
+                    </a:ext>
+                  </a:extLst>
+                </p:cNvPr>
+                <p:cNvSpPr/>
+                <p:nvPr/>
+              </p:nvSpPr>
+              <p:spPr>
+                <a:xfrm>
+                  <a:off x="1965168" y="2704885"/>
+                  <a:ext cx="171374" cy="171374"/>
+                </a:xfrm>
+                <a:prstGeom prst="ellipse">
+                  <a:avLst/>
+                </a:prstGeom>
+                <a:solidFill>
+                  <a:schemeClr val="bg1"/>
+                </a:solidFill>
+                <a:ln w="79375">
+                  <a:solidFill>
+                    <a:schemeClr val="tx1"/>
+                  </a:solidFill>
+                </a:ln>
+              </p:spPr>
+              <p:style>
+                <a:lnRef idx="2">
+                  <a:schemeClr val="accent1">
+                    <a:shade val="50000"/>
+                  </a:schemeClr>
+                </a:lnRef>
+                <a:fillRef idx="1">
+                  <a:schemeClr val="accent1"/>
+                </a:fillRef>
+                <a:effectRef idx="0">
+                  <a:schemeClr val="accent1"/>
+                </a:effectRef>
+                <a:fontRef idx="minor">
+                  <a:schemeClr val="lt1"/>
+                </a:fontRef>
+              </p:style>
+              <p:txBody>
+                <a:bodyPr rtlCol="0" anchor="ctr"/>
+                <a:lstStyle/>
+                <a:p>
+                  <a:pPr algn="ctr"/>
+                  <a:endParaRPr lang="en-GB" sz="1600"/>
+                </a:p>
+              </p:txBody>
+            </p:sp>
+          </p:grpSp>
+          <p:sp>
+            <p:nvSpPr>
+              <p:cNvPr id="67" name="TextBox 66">
+                <a:extLst>
+                  <a:ext uri="{FF2B5EF4-FFF2-40B4-BE49-F238E27FC236}">
+                    <a16:creationId xmlns:a16="http://schemas.microsoft.com/office/drawing/2014/main" id="{4EC4CF44-75AA-B81B-1E0C-C2AEFB03BACE}"/>
+                  </a:ext>
+                </a:extLst>
+              </p:cNvPr>
+              <p:cNvSpPr txBox="1"/>
+              <p:nvPr/>
+            </p:nvSpPr>
+            <p:spPr>
+              <a:xfrm>
+                <a:off x="8988769" y="1833595"/>
+                <a:ext cx="2769754" cy="830997"/>
+              </a:xfrm>
+              <a:prstGeom prst="rect">
+                <a:avLst/>
+              </a:prstGeom>
+              <a:noFill/>
+            </p:spPr>
+            <p:txBody>
+              <a:bodyPr wrap="square" rtlCol="0" anchor="ctr">
+                <a:spAutoFit/>
+              </a:bodyPr>
+              <a:lstStyle/>
+              <a:p>
+                <a:pPr algn="ctr"/>
+                <a:r>
+                  <a:rPr lang="en-US" sz="1600" b="1" cap="all" dirty="0">
+                    <a:latin typeface="Alte Haas Grotesk" panose="02000503000000020004" pitchFamily="2" charset="0"/>
+                  </a:rPr>
+                  <a:t>Right-side Ports </a:t>
+                </a:r>
+                <a:r>
+                  <a:rPr lang="en-US" sz="1600" b="1" cap="all" dirty="0">
+                    <a:solidFill>
+                      <a:srgbClr val="C00000"/>
+                    </a:solidFill>
+                    <a:latin typeface="Alte Haas Grotesk" panose="02000503000000020004" pitchFamily="2" charset="0"/>
+                  </a:rPr>
+                  <a:t>for</a:t>
+                </a:r>
+                <a:r>
+                  <a:rPr lang="en-US" sz="1600" b="1" cap="all" dirty="0">
+                    <a:latin typeface="Alte Haas Grotesk" panose="02000503000000020004" pitchFamily="2" charset="0"/>
+                  </a:rPr>
+                  <a:t> </a:t>
+                </a:r>
+                <a:r>
+                  <a:rPr lang="en-US" sz="1600" b="1" cap="all" dirty="0">
+                    <a:solidFill>
+                      <a:srgbClr val="C00000"/>
+                    </a:solidFill>
+                    <a:latin typeface="Alte Haas Grotesk" panose="02000503000000020004" pitchFamily="2" charset="0"/>
+                  </a:rPr>
+                  <a:t>OUR domain to interact with others</a:t>
+                </a:r>
+              </a:p>
+            </p:txBody>
+          </p:sp>
+        </p:grpSp>
       </p:grpSp>
       <p:sp>
         <p:nvSpPr>
-          <p:cNvPr id="57" name="Rectangle 56">
+          <p:cNvPr id="59" name="TextBox 58">
             <a:extLst>
               <a:ext uri="{FF2B5EF4-FFF2-40B4-BE49-F238E27FC236}">
-                <a16:creationId xmlns:a16="http://schemas.microsoft.com/office/drawing/2014/main" id="{A3349801-769A-872D-3FC1-1A90440DBCB8}"/>
-              </a:ext>
-            </a:extLst>
-          </p:cNvPr>
-          <p:cNvSpPr/>
-          <p:nvPr/>
-        </p:nvSpPr>
-        <p:spPr>
-          <a:xfrm rot="17820000">
-            <a:off x="9623939" y="4098009"/>
-            <a:ext cx="1499414" cy="993583"/>
-          </a:xfrm>
-          <a:prstGeom prst="rect">
-            <a:avLst/>
-          </a:prstGeom>
-          <a:solidFill>
-            <a:srgbClr val="FFD966"/>
-          </a:solidFill>
-          <a:ln w="60325">
-            <a:solidFill>
-              <a:schemeClr val="tx1"/>
-            </a:solidFill>
-          </a:ln>
-        </p:spPr>
-        <p:style>
-          <a:lnRef idx="2">
-            <a:schemeClr val="accent1">
-              <a:shade val="50000"/>
-            </a:schemeClr>
-          </a:lnRef>
-          <a:fillRef idx="1">
-            <a:schemeClr val="accent1"/>
-          </a:fillRef>
-          <a:effectRef idx="0">
-            <a:schemeClr val="accent1"/>
-          </a:effectRef>
-          <a:fontRef idx="minor">
-            <a:schemeClr val="lt1"/>
-          </a:fontRef>
-        </p:style>
-        <p:txBody>
-          <a:bodyPr rtlCol="0" anchor="ctr"/>
-          <a:lstStyle/>
-          <a:p>
-            <a:pPr algn="ctr"/>
-            <a:r>
-              <a:rPr lang="fr-FR" b="1" cap="all" dirty="0">
-                <a:solidFill>
-                  <a:schemeClr val="tx1"/>
-                </a:solidFill>
-                <a:latin typeface="Alte Haas Grotesk" panose="02000503000000020004" pitchFamily="2" charset="0"/>
-              </a:rPr>
-              <a:t>Right </a:t>
-            </a:r>
-            <a:r>
-              <a:rPr lang="fr-FR" b="1" cap="all" dirty="0" err="1">
-                <a:solidFill>
-                  <a:schemeClr val="tx1"/>
-                </a:solidFill>
-                <a:latin typeface="Alte Haas Grotesk" panose="02000503000000020004" pitchFamily="2" charset="0"/>
-              </a:rPr>
-              <a:t>Adapters</a:t>
-            </a:r>
-            <a:endParaRPr lang="en-GB" b="1" cap="all" dirty="0">
-              <a:solidFill>
-                <a:schemeClr val="tx1"/>
-              </a:solidFill>
-              <a:latin typeface="Alte Haas Grotesk" panose="02000503000000020004" pitchFamily="2" charset="0"/>
-            </a:endParaRPr>
-          </a:p>
-        </p:txBody>
-      </p:sp>
-      <p:sp>
-        <p:nvSpPr>
-          <p:cNvPr id="58" name="TextBox 57">
-            <a:extLst>
-              <a:ext uri="{FF2B5EF4-FFF2-40B4-BE49-F238E27FC236}">
-                <a16:creationId xmlns:a16="http://schemas.microsoft.com/office/drawing/2014/main" id="{C4310008-1AAB-20E4-D325-4A13492AF26D}"/>
+                <a16:creationId xmlns:a16="http://schemas.microsoft.com/office/drawing/2014/main" id="{2102DB3A-79CD-9E2E-981E-29FC394C7B17}"/>
               </a:ext>
             </a:extLst>
           </p:cNvPr>
@@ -41678,8 +42527,8 @@
         </p:nvSpPr>
         <p:spPr>
           <a:xfrm>
-            <a:off x="645547" y="2263083"/>
-            <a:ext cx="2769754" cy="1015663"/>
+            <a:off x="6800596" y="3388830"/>
+            <a:ext cx="618793" cy="215444"/>
           </a:xfrm>
           <a:prstGeom prst="rect">
             <a:avLst/>
@@ -41687,117 +42536,19 @@
           <a:noFill/>
         </p:spPr>
         <p:txBody>
-          <a:bodyPr wrap="square" rtlCol="0" anchor="ctr">
+          <a:bodyPr wrap="square" rtlCol="0">
             <a:spAutoFit/>
           </a:bodyPr>
           <a:lstStyle/>
           <a:p>
             <a:pPr algn="ctr"/>
             <a:r>
-              <a:rPr lang="en-US" sz="2000" b="1" cap="all" dirty="0">
+              <a:rPr lang="fr-FR" sz="800" b="1" dirty="0">
                 <a:latin typeface="Alte Haas Grotesk" panose="02000503000000020004" pitchFamily="2" charset="0"/>
               </a:rPr>
-              <a:t>Left-side Ports</a:t>
+              <a:t>« uses »</a:t>
             </a:r>
-          </a:p>
-          <a:p>
-            <a:pPr algn="ctr"/>
-            <a:r>
-              <a:rPr lang="en-US" sz="2000" b="1" cap="all" dirty="0">
-                <a:solidFill>
-                  <a:srgbClr val="C00000"/>
-                </a:solidFill>
-                <a:latin typeface="Alte Haas Grotesk" panose="02000503000000020004" pitchFamily="2" charset="0"/>
-              </a:rPr>
-              <a:t>to enter our DOMAIN</a:t>
-            </a:r>
-          </a:p>
-        </p:txBody>
-      </p:sp>
-      <p:sp>
-        <p:nvSpPr>
-          <p:cNvPr id="41" name="Rectangle 40">
-            <a:extLst>
-              <a:ext uri="{FF2B5EF4-FFF2-40B4-BE49-F238E27FC236}">
-                <a16:creationId xmlns:a16="http://schemas.microsoft.com/office/drawing/2014/main" id="{66E8D063-97D3-B05D-E4FD-111BEFA4586E}"/>
-              </a:ext>
-            </a:extLst>
-          </p:cNvPr>
-          <p:cNvSpPr/>
-          <p:nvPr/>
-        </p:nvSpPr>
-        <p:spPr>
-          <a:xfrm rot="17820000">
-            <a:off x="1087377" y="4101312"/>
-            <a:ext cx="1499414" cy="993583"/>
-          </a:xfrm>
-          <a:prstGeom prst="rect">
-            <a:avLst/>
-          </a:prstGeom>
-          <a:solidFill>
-            <a:schemeClr val="accent6">
-              <a:lumMod val="20000"/>
-              <a:lumOff val="80000"/>
-            </a:schemeClr>
-          </a:solidFill>
-          <a:ln w="60325">
-            <a:solidFill>
-              <a:schemeClr val="tx1"/>
-            </a:solidFill>
-          </a:ln>
-        </p:spPr>
-        <p:style>
-          <a:lnRef idx="2">
-            <a:schemeClr val="accent1">
-              <a:shade val="50000"/>
-            </a:schemeClr>
-          </a:lnRef>
-          <a:fillRef idx="1">
-            <a:schemeClr val="accent1"/>
-          </a:fillRef>
-          <a:effectRef idx="0">
-            <a:schemeClr val="accent1"/>
-          </a:effectRef>
-          <a:fontRef idx="minor">
-            <a:schemeClr val="lt1"/>
-          </a:fontRef>
-        </p:style>
-        <p:txBody>
-          <a:bodyPr rtlCol="0" anchor="ctr"/>
-          <a:lstStyle/>
-          <a:p>
-            <a:pPr algn="ctr"/>
-            <a:r>
-              <a:rPr lang="fr-FR" b="1" cap="all" dirty="0" err="1">
-                <a:solidFill>
-                  <a:schemeClr val="tx1"/>
-                </a:solidFill>
-                <a:latin typeface="Alte Haas Grotesk" panose="02000503000000020004" pitchFamily="2" charset="0"/>
-              </a:rPr>
-              <a:t>Left</a:t>
-            </a:r>
-            <a:r>
-              <a:rPr lang="fr-FR" b="1" cap="all" dirty="0">
-                <a:solidFill>
-                  <a:schemeClr val="tx1"/>
-                </a:solidFill>
-                <a:latin typeface="Alte Haas Grotesk" panose="02000503000000020004" pitchFamily="2" charset="0"/>
-              </a:rPr>
-              <a:t> </a:t>
-            </a:r>
-            <a:r>
-              <a:rPr lang="fr-FR" b="1" cap="all" dirty="0" err="1">
-                <a:solidFill>
-                  <a:schemeClr val="tx1"/>
-                </a:solidFill>
-                <a:latin typeface="Alte Haas Grotesk" panose="02000503000000020004" pitchFamily="2" charset="0"/>
-              </a:rPr>
-              <a:t>adapters</a:t>
-            </a:r>
-            <a:endParaRPr lang="en-GB" b="1" cap="all" dirty="0">
-              <a:solidFill>
-                <a:schemeClr val="tx1"/>
-              </a:solidFill>
+            <a:endParaRPr lang="en-GB" sz="800" b="1" dirty="0">
               <a:latin typeface="Alte Haas Grotesk" panose="02000503000000020004" pitchFamily="2" charset="0"/>
             </a:endParaRPr>
           </a:p>
@@ -41805,10 +42556,10 @@
       </p:sp>
       <p:sp>
         <p:nvSpPr>
-          <p:cNvPr id="42" name="TextBox 41">
+          <p:cNvPr id="68" name="TextBox 67">
             <a:extLst>
               <a:ext uri="{FF2B5EF4-FFF2-40B4-BE49-F238E27FC236}">
-                <a16:creationId xmlns:a16="http://schemas.microsoft.com/office/drawing/2014/main" id="{44A9F5C7-8234-E48F-1C51-ED05DD5983F4}"/>
+                <a16:creationId xmlns:a16="http://schemas.microsoft.com/office/drawing/2014/main" id="{7A5F9E24-0B8E-F9C4-E2A5-BC49F978C415}"/>
               </a:ext>
             </a:extLst>
           </p:cNvPr>
@@ -41817,8 +42568,8 @@
         </p:nvSpPr>
         <p:spPr>
           <a:xfrm>
-            <a:off x="548538" y="5433932"/>
-            <a:ext cx="2769754" cy="1323439"/>
+            <a:off x="6452966" y="4179326"/>
+            <a:ext cx="618793" cy="215444"/>
           </a:xfrm>
           <a:prstGeom prst="rect">
             <a:avLst/>
@@ -41826,88 +42577,30 @@
           <a:noFill/>
         </p:spPr>
         <p:txBody>
-          <a:bodyPr wrap="square" rtlCol="0" anchor="ctr">
+          <a:bodyPr wrap="square" rtlCol="0">
             <a:spAutoFit/>
           </a:bodyPr>
           <a:lstStyle/>
           <a:p>
             <a:pPr algn="ctr"/>
             <a:r>
-              <a:rPr lang="en-US" sz="2000" b="1" cap="all" dirty="0">
+              <a:rPr lang="fr-FR" sz="800" b="1" dirty="0">
                 <a:latin typeface="Alte Haas Grotesk" panose="02000503000000020004" pitchFamily="2" charset="0"/>
               </a:rPr>
-              <a:t>Left-side adapters translate </a:t>
+              <a:t>« uses »</a:t>
             </a:r>
-            <a:br>
-              <a:rPr lang="en-US" sz="2000" b="1" cap="all" dirty="0">
-                <a:latin typeface="Alte Haas Grotesk" panose="02000503000000020004" pitchFamily="2" charset="0"/>
-              </a:rPr>
-            </a:br>
-            <a:r>
-              <a:rPr lang="en-US" sz="2000" b="1" cap="all" dirty="0">
-                <a:solidFill>
-                  <a:srgbClr val="C00000"/>
-                </a:solidFill>
-                <a:latin typeface="Alte Haas Grotesk" panose="02000503000000020004" pitchFamily="2" charset="0"/>
-              </a:rPr>
-              <a:t>tech to domain</a:t>
-            </a:r>
-          </a:p>
-        </p:txBody>
-      </p:sp>
-      <p:sp>
-        <p:nvSpPr>
-          <p:cNvPr id="54" name="TextBox 53">
-            <a:extLst>
-              <a:ext uri="{FF2B5EF4-FFF2-40B4-BE49-F238E27FC236}">
-                <a16:creationId xmlns:a16="http://schemas.microsoft.com/office/drawing/2014/main" id="{F04CF76F-E99B-A719-220D-20B97B210456}"/>
-              </a:ext>
-            </a:extLst>
-          </p:cNvPr>
-          <p:cNvSpPr txBox="1"/>
-          <p:nvPr/>
-        </p:nvSpPr>
-        <p:spPr>
-          <a:xfrm>
-            <a:off x="8988769" y="5441075"/>
-            <a:ext cx="2769754" cy="1323439"/>
-          </a:xfrm>
-          <a:prstGeom prst="rect">
-            <a:avLst/>
-          </a:prstGeom>
-          <a:noFill/>
-        </p:spPr>
-        <p:txBody>
-          <a:bodyPr wrap="square" rtlCol="0" anchor="ctr">
-            <a:spAutoFit/>
-          </a:bodyPr>
-          <a:lstStyle/>
-          <a:p>
-            <a:pPr algn="ctr"/>
-            <a:r>
-              <a:rPr lang="en-US" sz="2000" b="1" cap="all" dirty="0">
-                <a:latin typeface="Alte Haas Grotesk" panose="02000503000000020004" pitchFamily="2" charset="0"/>
-              </a:rPr>
-              <a:t>Right-side adapters translate </a:t>
-            </a:r>
-            <a:r>
-              <a:rPr lang="en-US" sz="2000" b="1" cap="all" dirty="0">
-                <a:solidFill>
-                  <a:srgbClr val="C00000"/>
-                </a:solidFill>
-                <a:latin typeface="Alte Haas Grotesk" panose="02000503000000020004" pitchFamily="2" charset="0"/>
-              </a:rPr>
-              <a:t>domain to tech</a:t>
-            </a:r>
+            <a:endParaRPr lang="en-GB" sz="800" b="1" dirty="0">
+              <a:latin typeface="Alte Haas Grotesk" panose="02000503000000020004" pitchFamily="2" charset="0"/>
+            </a:endParaRPr>
           </a:p>
         </p:txBody>
       </p:sp>
       <p:grpSp>
         <p:nvGrpSpPr>
-          <p:cNvPr id="60" name="Group 59">
+          <p:cNvPr id="21" name="Group 20">
             <a:extLst>
               <a:ext uri="{FF2B5EF4-FFF2-40B4-BE49-F238E27FC236}">
-                <a16:creationId xmlns:a16="http://schemas.microsoft.com/office/drawing/2014/main" id="{69569D49-812D-A592-10BD-E479797A7894}"/>
+                <a16:creationId xmlns:a16="http://schemas.microsoft.com/office/drawing/2014/main" id="{427D2682-1FBB-B97B-7115-0C07029C70FF}"/>
               </a:ext>
             </a:extLst>
           </p:cNvPr>
@@ -41915,62 +42608,19 @@
           <p:nvPr/>
         </p:nvGrpSpPr>
         <p:grpSpPr>
-          <a:xfrm rot="17647871">
-            <a:off x="10156653" y="1254864"/>
-            <a:ext cx="433987" cy="966307"/>
-            <a:chOff x="1965168" y="2704885"/>
-            <a:chExt cx="171374" cy="381578"/>
+          <a:xfrm>
+            <a:off x="1117876" y="3308979"/>
+            <a:ext cx="1045500" cy="1292575"/>
+            <a:chOff x="1115646" y="3414241"/>
+            <a:chExt cx="1045500" cy="1076682"/>
           </a:xfrm>
         </p:grpSpPr>
-        <p:cxnSp>
-          <p:nvCxnSpPr>
-            <p:cNvPr id="61" name="Straight Connector 60">
+        <p:sp>
+          <p:nvSpPr>
+            <p:cNvPr id="18" name="Arrow: Right 17">
               <a:extLst>
                 <a:ext uri="{FF2B5EF4-FFF2-40B4-BE49-F238E27FC236}">
-                  <a16:creationId xmlns:a16="http://schemas.microsoft.com/office/drawing/2014/main" id="{7C2BEF41-370A-867C-AE12-3963289987CF}"/>
-                </a:ext>
-              </a:extLst>
-            </p:cNvPr>
-            <p:cNvCxnSpPr>
-              <a:cxnSpLocks/>
-            </p:cNvCxnSpPr>
-            <p:nvPr/>
-          </p:nvCxnSpPr>
-          <p:spPr>
-            <a:xfrm>
-              <a:off x="2050855" y="2876259"/>
-              <a:ext cx="0" cy="210204"/>
-            </a:xfrm>
-            <a:prstGeom prst="line">
-              <a:avLst/>
-            </a:prstGeom>
-            <a:ln w="79375">
-              <a:solidFill>
-                <a:schemeClr val="tx1"/>
-              </a:solidFill>
-            </a:ln>
-          </p:spPr>
-          <p:style>
-            <a:lnRef idx="1">
-              <a:schemeClr val="accent1"/>
-            </a:lnRef>
-            <a:fillRef idx="0">
-              <a:schemeClr val="accent1"/>
-            </a:fillRef>
-            <a:effectRef idx="0">
-              <a:schemeClr val="accent1"/>
-            </a:effectRef>
-            <a:fontRef idx="minor">
-              <a:schemeClr val="tx1"/>
-            </a:fontRef>
-          </p:style>
-        </p:cxnSp>
-        <p:sp>
-          <p:nvSpPr>
-            <p:cNvPr id="62" name="Oval 61">
-              <a:extLst>
-                <a:ext uri="{FF2B5EF4-FFF2-40B4-BE49-F238E27FC236}">
-                  <a16:creationId xmlns:a16="http://schemas.microsoft.com/office/drawing/2014/main" id="{B947F06E-0722-4212-8690-62494898A77C}"/>
+                  <a16:creationId xmlns:a16="http://schemas.microsoft.com/office/drawing/2014/main" id="{BE487A0D-C9E9-F011-5CC0-D5C1E8266E82}"/>
                 </a:ext>
               </a:extLst>
             </p:cNvPr>
@@ -41978,110 +42628,199 @@
             <p:nvPr/>
           </p:nvSpPr>
           <p:spPr>
-            <a:xfrm>
-              <a:off x="1965168" y="2704885"/>
-              <a:ext cx="171374" cy="171374"/>
+            <a:xfrm rot="5400000">
+              <a:off x="1104629" y="3554907"/>
+              <a:ext cx="1076682" cy="795349"/>
             </a:xfrm>
-            <a:prstGeom prst="ellipse">
+            <a:prstGeom prst="rightArrow">
               <a:avLst/>
             </a:prstGeom>
             <a:solidFill>
-              <a:schemeClr val="bg1"/>
+              <a:schemeClr val="bg1">
+                <a:alpha val="50000"/>
+              </a:schemeClr>
             </a:solidFill>
-            <a:ln w="79375">
-              <a:solidFill>
-                <a:schemeClr val="tx1"/>
-              </a:solidFill>
-            </a:ln>
           </p:spPr>
-          <p:style>
-            <a:lnRef idx="2">
-              <a:schemeClr val="accent1">
-                <a:shade val="50000"/>
-              </a:schemeClr>
-            </a:lnRef>
-            <a:fillRef idx="1">
-              <a:schemeClr val="accent1"/>
-            </a:fillRef>
-            <a:effectRef idx="0">
-              <a:schemeClr val="accent1"/>
-            </a:effectRef>
-            <a:fontRef idx="minor">
-              <a:schemeClr val="lt1"/>
-            </a:fontRef>
-          </p:style>
           <p:txBody>
-            <a:bodyPr rtlCol="0" anchor="ctr"/>
+            <a:bodyPr wrap="square" rtlCol="0">
+              <a:noAutofit/>
+            </a:bodyPr>
             <a:lstStyle/>
             <a:p>
+              <a:endParaRPr lang="en-US" sz="1400" i="1">
+                <a:solidFill>
+                  <a:schemeClr val="bg1"/>
+                </a:solidFill>
+              </a:endParaRPr>
+            </a:p>
+          </p:txBody>
+        </p:sp>
+        <p:sp>
+          <p:nvSpPr>
+            <p:cNvPr id="19" name="TextBox 18">
+              <a:extLst>
+                <a:ext uri="{FF2B5EF4-FFF2-40B4-BE49-F238E27FC236}">
+                  <a16:creationId xmlns:a16="http://schemas.microsoft.com/office/drawing/2014/main" id="{3FE23F85-D8E6-DC0E-15A5-2227B4E1B0F5}"/>
+                </a:ext>
+              </a:extLst>
+            </p:cNvPr>
+            <p:cNvSpPr txBox="1"/>
+            <p:nvPr/>
+          </p:nvSpPr>
+          <p:spPr>
+            <a:xfrm>
+              <a:off x="1115646" y="3580939"/>
+              <a:ext cx="1045500" cy="369332"/>
+            </a:xfrm>
+            <a:prstGeom prst="rect">
+              <a:avLst/>
+            </a:prstGeom>
+            <a:solidFill>
+              <a:schemeClr val="bg1">
+                <a:alpha val="50000"/>
+              </a:schemeClr>
+            </a:solidFill>
+          </p:spPr>
+          <p:txBody>
+            <a:bodyPr wrap="square" rtlCol="0">
+              <a:noAutofit/>
+            </a:bodyPr>
+            <a:lstStyle>
+              <a:defPPr>
+                <a:defRPr lang="fr-FR"/>
+              </a:defPPr>
+              <a:lvl1pPr>
+                <a:defRPr sz="1400" i="1">
+                  <a:solidFill>
+                    <a:schemeClr val="bg1"/>
+                  </a:solidFill>
+                </a:defRPr>
+              </a:lvl1pPr>
+            </a:lstStyle>
+            <a:p>
               <a:pPr algn="ctr"/>
-              <a:endParaRPr lang="en-GB" sz="2000"/>
+              <a:r>
+                <a:rPr lang="en-US" sz="2000" b="1" i="0" dirty="0">
+                  <a:solidFill>
+                    <a:schemeClr val="tx1"/>
+                  </a:solidFill>
+                  <a:latin typeface="Alte Haas Grotesk" panose="02000503000000020004" pitchFamily="2" charset="0"/>
+                </a:rPr>
+                <a:t>“use”</a:t>
+              </a:r>
             </a:p>
           </p:txBody>
         </p:sp>
       </p:grpSp>
-      <p:sp>
-        <p:nvSpPr>
-          <p:cNvPr id="67" name="TextBox 66">
+      <p:grpSp>
+        <p:nvGrpSpPr>
+          <p:cNvPr id="20" name="Group 19">
             <a:extLst>
               <a:ext uri="{FF2B5EF4-FFF2-40B4-BE49-F238E27FC236}">
-                <a16:creationId xmlns:a16="http://schemas.microsoft.com/office/drawing/2014/main" id="{4EC4CF44-75AA-B81B-1E0C-C2AEFB03BACE}"/>
+                <a16:creationId xmlns:a16="http://schemas.microsoft.com/office/drawing/2014/main" id="{EEFE0FEB-9CC7-1EB0-3E1B-B632CE685320}"/>
               </a:ext>
             </a:extLst>
           </p:cNvPr>
-          <p:cNvSpPr txBox="1"/>
+          <p:cNvGrpSpPr/>
           <p:nvPr/>
-        </p:nvSpPr>
-        <p:spPr>
+        </p:nvGrpSpPr>
+        <p:grpSpPr>
           <a:xfrm>
-            <a:off x="8988769" y="2113609"/>
-            <a:ext cx="2769754" cy="1323439"/>
+            <a:off x="9560590" y="2894860"/>
+            <a:ext cx="1753585" cy="1166637"/>
+            <a:chOff x="9301456" y="2920492"/>
+            <a:chExt cx="1753585" cy="1076682"/>
           </a:xfrm>
-          <a:prstGeom prst="rect">
-            <a:avLst/>
-          </a:prstGeom>
-          <a:noFill/>
-        </p:spPr>
-        <p:txBody>
-          <a:bodyPr wrap="square" rtlCol="0" anchor="ctr">
-            <a:spAutoFit/>
-          </a:bodyPr>
-          <a:lstStyle/>
-          <a:p>
-            <a:pPr algn="ctr"/>
-            <a:r>
-              <a:rPr lang="en-US" sz="2000" b="1" cap="all" dirty="0">
-                <a:latin typeface="Alte Haas Grotesk" panose="02000503000000020004" pitchFamily="2" charset="0"/>
-              </a:rPr>
-              <a:t>Right-side Ports </a:t>
-            </a:r>
-            <a:r>
-              <a:rPr lang="en-US" sz="2000" b="1" cap="all" dirty="0">
+        </p:grpSpPr>
+        <p:sp>
+          <p:nvSpPr>
+            <p:cNvPr id="69" name="Arrow: Right 68">
+              <a:extLst>
+                <a:ext uri="{FF2B5EF4-FFF2-40B4-BE49-F238E27FC236}">
+                  <a16:creationId xmlns:a16="http://schemas.microsoft.com/office/drawing/2014/main" id="{F050B0EE-25EC-04DD-87E8-D3CB8F564012}"/>
+                </a:ext>
+              </a:extLst>
+            </p:cNvPr>
+            <p:cNvSpPr/>
+            <p:nvPr/>
+          </p:nvSpPr>
+          <p:spPr>
+            <a:xfrm rot="16200000">
+              <a:off x="9604364" y="3061158"/>
+              <a:ext cx="1076682" cy="795349"/>
+            </a:xfrm>
+            <a:prstGeom prst="rightArrow">
+              <a:avLst/>
+            </a:prstGeom>
+            <a:solidFill>
+              <a:schemeClr val="bg1">
+                <a:alpha val="50000"/>
+              </a:schemeClr>
+            </a:solidFill>
+          </p:spPr>
+          <p:txBody>
+            <a:bodyPr wrap="square" rtlCol="0">
+              <a:noAutofit/>
+            </a:bodyPr>
+            <a:lstStyle/>
+            <a:p>
+              <a:endParaRPr lang="en-US" sz="1400" i="1">
                 <a:solidFill>
-                  <a:srgbClr val="C00000"/>
+                  <a:schemeClr val="bg1"/>
                 </a:solidFill>
-                <a:latin typeface="Alte Haas Grotesk" panose="02000503000000020004" pitchFamily="2" charset="0"/>
-              </a:rPr>
-              <a:t>for</a:t>
-            </a:r>
-            <a:r>
-              <a:rPr lang="en-US" sz="2000" b="1" cap="all" dirty="0">
-                <a:latin typeface="Alte Haas Grotesk" panose="02000503000000020004" pitchFamily="2" charset="0"/>
-              </a:rPr>
-              <a:t> </a:t>
-            </a:r>
-            <a:r>
-              <a:rPr lang="en-US" sz="2000" b="1" cap="all" dirty="0">
-                <a:solidFill>
-                  <a:srgbClr val="C00000"/>
-                </a:solidFill>
-                <a:latin typeface="Alte Haas Grotesk" panose="02000503000000020004" pitchFamily="2" charset="0"/>
-              </a:rPr>
-              <a:t>OUR domain to interact with others</a:t>
-            </a:r>
-          </a:p>
-        </p:txBody>
-      </p:sp>
+              </a:endParaRPr>
+            </a:p>
+          </p:txBody>
+        </p:sp>
+        <p:sp>
+          <p:nvSpPr>
+            <p:cNvPr id="72" name="TextBox 71">
+              <a:extLst>
+                <a:ext uri="{FF2B5EF4-FFF2-40B4-BE49-F238E27FC236}">
+                  <a16:creationId xmlns:a16="http://schemas.microsoft.com/office/drawing/2014/main" id="{97D1F1F7-B2A8-BC0F-4EA4-B2934A5FA6A0}"/>
+                </a:ext>
+              </a:extLst>
+            </p:cNvPr>
+            <p:cNvSpPr txBox="1"/>
+            <p:nvPr/>
+          </p:nvSpPr>
+          <p:spPr>
+            <a:xfrm>
+              <a:off x="9301456" y="3465142"/>
+              <a:ext cx="1753585" cy="351393"/>
+            </a:xfrm>
+            <a:prstGeom prst="rect">
+              <a:avLst/>
+            </a:prstGeom>
+            <a:solidFill>
+              <a:schemeClr val="bg1">
+                <a:alpha val="50000"/>
+              </a:schemeClr>
+            </a:solidFill>
+          </p:spPr>
+          <p:txBody>
+            <a:bodyPr wrap="square" rtlCol="0">
+              <a:noAutofit/>
+            </a:bodyPr>
+            <a:lstStyle>
+              <a:defPPr>
+                <a:defRPr lang="fr-FR"/>
+              </a:defPPr>
+              <a:lvl1pPr algn="ctr">
+                <a:defRPr sz="2000" b="1" i="0">
+                  <a:latin typeface="Alte Haas Grotesk" panose="02000503000000020004" pitchFamily="2" charset="0"/>
+                </a:defRPr>
+              </a:lvl1pPr>
+            </a:lstStyle>
+            <a:p>
+              <a:r>
+                <a:rPr lang="en-US" dirty="0"/>
+                <a:t>“implement”</a:t>
+              </a:r>
+            </a:p>
+          </p:txBody>
+        </p:sp>
+      </p:grpSp>
     </p:spTree>
     <p:extLst>
       <p:ext uri="{BB962C8B-B14F-4D97-AF65-F5344CB8AC3E}">

</xml_diff>